<commit_message>
Changes from the last week:
Implemented the new PerformBounce() method
Adjusted the MPI_Bcast() to broadcast all elements together
Adjusted the usePCMethod
Corrected the internship report
Added the final presentation
</commit_message>
<xml_diff>
--- a/Bericht/Abschlusspresentation.pptx
+++ b/Bericht/Abschlusspresentation.pptx
@@ -11,20 +11,22 @@
     <p:sldMasterId id="2147483680" r:id="rId7"/>
   </p:sldMasterIdLst>
   <p:notesMasterIdLst>
-    <p:notesMasterId r:id="rId19"/>
+    <p:notesMasterId r:id="rId21"/>
   </p:notesMasterIdLst>
   <p:sldIdLst>
     <p:sldId id="355" r:id="rId8"/>
     <p:sldId id="356" r:id="rId9"/>
     <p:sldId id="357" r:id="rId10"/>
     <p:sldId id="358" r:id="rId11"/>
-    <p:sldId id="359" r:id="rId12"/>
-    <p:sldId id="360" r:id="rId13"/>
-    <p:sldId id="364" r:id="rId14"/>
-    <p:sldId id="363" r:id="rId15"/>
-    <p:sldId id="365" r:id="rId16"/>
-    <p:sldId id="366" r:id="rId17"/>
-    <p:sldId id="367" r:id="rId18"/>
+    <p:sldId id="368" r:id="rId12"/>
+    <p:sldId id="359" r:id="rId13"/>
+    <p:sldId id="360" r:id="rId14"/>
+    <p:sldId id="364" r:id="rId15"/>
+    <p:sldId id="363" r:id="rId16"/>
+    <p:sldId id="365" r:id="rId17"/>
+    <p:sldId id="366" r:id="rId18"/>
+    <p:sldId id="367" r:id="rId19"/>
+    <p:sldId id="369" r:id="rId20"/>
   </p:sldIdLst>
   <p:sldSz cx="12192000" cy="6858000"/>
   <p:notesSz cx="6858000" cy="9144000"/>
@@ -254,7 +256,7 @@
           <a:p>
             <a:fld id="{390B7238-C8AA-4053-ADDE-FFB5E77BCA46}" type="datetimeFigureOut">
               <a:rPr lang="en-US" smtClean="0"/>
-              <a:t>2/10/2022</a:t>
+              <a:t>2/21/2022</a:t>
             </a:fld>
             <a:endParaRPr lang="en-US"/>
           </a:p>
@@ -412,7 +414,7 @@
           <a:p>
             <a:fld id="{BB240569-BAD6-4861-A88A-5ECEBC9A2009}" type="slidenum">
               <a:rPr lang="en-US" smtClean="0"/>
-              <a:t>‹#›</a:t>
+              <a:t>‹Nr.›</a:t>
             </a:fld>
             <a:endParaRPr lang="en-US"/>
           </a:p>
@@ -678,7 +680,7 @@
           <a:p>
             <a:fld id="{BB240569-BAD6-4861-A88A-5ECEBC9A2009}" type="slidenum">
               <a:rPr lang="en-US" smtClean="0"/>
-              <a:t>6</a:t>
+              <a:t>7</a:t>
             </a:fld>
             <a:endParaRPr lang="en-US"/>
           </a:p>
@@ -762,7 +764,7 @@
           <a:p>
             <a:fld id="{BB240569-BAD6-4861-A88A-5ECEBC9A2009}" type="slidenum">
               <a:rPr lang="en-US" smtClean="0"/>
-              <a:t>7</a:t>
+              <a:t>8</a:t>
             </a:fld>
             <a:endParaRPr lang="en-US"/>
           </a:p>
@@ -846,7 +848,7 @@
           <a:p>
             <a:fld id="{BB240569-BAD6-4861-A88A-5ECEBC9A2009}" type="slidenum">
               <a:rPr lang="en-US" smtClean="0"/>
-              <a:t>8</a:t>
+              <a:t>9</a:t>
             </a:fld>
             <a:endParaRPr lang="en-US"/>
           </a:p>
@@ -1070,7 +1072,7 @@
           <a:p>
             <a:fld id="{E45DED98-5987-4D9A-AB79-D34B0B5CBFCF}" type="slidenum">
               <a:rPr lang="en-US" smtClean="0"/>
-              <a:t>‹#›</a:t>
+              <a:t>‹Nr.›</a:t>
             </a:fld>
             <a:endParaRPr lang="en-US"/>
           </a:p>
@@ -1242,7 +1244,7 @@
             <a:fld id="{CE58CB1E-F828-4F11-99E0-327109AF9DA4}" type="slidenum">
               <a:rPr lang="de-DE" smtClean="0"/>
               <a:pPr/>
-              <a:t>‹#›</a:t>
+              <a:t>‹Nr.›</a:t>
             </a:fld>
             <a:endParaRPr lang="de-DE"/>
           </a:p>
@@ -1504,7 +1506,7 @@
             <a:fld id="{CE58CB1E-F828-4F11-99E0-327109AF9DA4}" type="slidenum">
               <a:rPr lang="de-DE" smtClean="0"/>
               <a:pPr/>
-              <a:t>‹#›</a:t>
+              <a:t>‹Nr.›</a:t>
             </a:fld>
             <a:endParaRPr lang="de-DE"/>
           </a:p>
@@ -1772,7 +1774,7 @@
             <a:fld id="{CE58CB1E-F828-4F11-99E0-327109AF9DA4}" type="slidenum">
               <a:rPr lang="de-DE" smtClean="0"/>
               <a:pPr/>
-              <a:t>‹#›</a:t>
+              <a:t>‹Nr.›</a:t>
             </a:fld>
             <a:endParaRPr lang="de-DE"/>
           </a:p>
@@ -2013,7 +2015,7 @@
             <a:fld id="{CE58CB1E-F828-4F11-99E0-327109AF9DA4}" type="slidenum">
               <a:rPr lang="de-DE" smtClean="0"/>
               <a:pPr/>
-              <a:t>‹#›</a:t>
+              <a:t>‹Nr.›</a:t>
             </a:fld>
             <a:endParaRPr lang="de-DE"/>
           </a:p>
@@ -2158,7 +2160,7 @@
             <a:fld id="{CE58CB1E-F828-4F11-99E0-327109AF9DA4}" type="slidenum">
               <a:rPr lang="de-DE" smtClean="0"/>
               <a:pPr/>
-              <a:t>‹#›</a:t>
+              <a:t>‹Nr.›</a:t>
             </a:fld>
             <a:endParaRPr lang="de-DE"/>
           </a:p>
@@ -2311,7 +2313,7 @@
             <a:fld id="{CE58CB1E-F828-4F11-99E0-327109AF9DA4}" type="slidenum">
               <a:rPr lang="de-DE" smtClean="0"/>
               <a:pPr/>
-              <a:t>‹#›</a:t>
+              <a:t>‹Nr.›</a:t>
             </a:fld>
             <a:endParaRPr lang="de-DE"/>
           </a:p>
@@ -2613,7 +2615,7 @@
           <a:p>
             <a:fld id="{E45DED98-5987-4D9A-AB79-D34B0B5CBFCF}" type="slidenum">
               <a:rPr lang="en-US" smtClean="0"/>
-              <a:t>‹#›</a:t>
+              <a:t>‹Nr.›</a:t>
             </a:fld>
             <a:endParaRPr lang="en-US"/>
           </a:p>
@@ -2791,7 +2793,7 @@
             <a:fld id="{CE58CB1E-F828-4F11-99E0-327109AF9DA4}" type="slidenum">
               <a:rPr lang="de-DE" smtClean="0"/>
               <a:pPr/>
-              <a:t>‹#›</a:t>
+              <a:t>‹Nr.›</a:t>
             </a:fld>
             <a:endParaRPr lang="de-DE"/>
           </a:p>
@@ -3051,7 +3053,7 @@
             <a:fld id="{CE58CB1E-F828-4F11-99E0-327109AF9DA4}" type="slidenum">
               <a:rPr lang="de-DE" smtClean="0"/>
               <a:pPr/>
-              <a:t>‹#›</a:t>
+              <a:t>‹Nr.›</a:t>
             </a:fld>
             <a:endParaRPr lang="de-DE"/>
           </a:p>
@@ -3296,7 +3298,7 @@
             <a:fld id="{CE58CB1E-F828-4F11-99E0-327109AF9DA4}" type="slidenum">
               <a:rPr lang="de-DE" smtClean="0"/>
               <a:pPr/>
-              <a:t>‹#›</a:t>
+              <a:t>‹Nr.›</a:t>
             </a:fld>
             <a:endParaRPr lang="de-DE"/>
           </a:p>
@@ -3491,7 +3493,7 @@
             <a:fld id="{CE58CB1E-F828-4F11-99E0-327109AF9DA4}" type="slidenum">
               <a:rPr lang="de-DE" smtClean="0"/>
               <a:pPr/>
-              <a:t>‹#›</a:t>
+              <a:t>‹Nr.›</a:t>
             </a:fld>
             <a:endParaRPr lang="de-DE"/>
           </a:p>
@@ -3614,7 +3616,7 @@
             <a:fld id="{CE58CB1E-F828-4F11-99E0-327109AF9DA4}" type="slidenum">
               <a:rPr lang="de-DE" smtClean="0"/>
               <a:pPr/>
-              <a:t>‹#›</a:t>
+              <a:t>‹Nr.›</a:t>
             </a:fld>
             <a:endParaRPr lang="de-DE"/>
           </a:p>
@@ -3986,7 +3988,7 @@
             <a:fld id="{CE58CB1E-F828-4F11-99E0-327109AF9DA4}" type="slidenum">
               <a:rPr lang="de-DE" smtClean="0"/>
               <a:pPr/>
-              <a:t>‹#›</a:t>
+              <a:t>‹Nr.›</a:t>
             </a:fld>
             <a:endParaRPr lang="de-DE"/>
           </a:p>
@@ -4301,7 +4303,7 @@
             <a:fld id="{CE58CB1E-F828-4F11-99E0-327109AF9DA4}" type="slidenum">
               <a:rPr lang="de-DE" smtClean="0"/>
               <a:pPr/>
-              <a:t>‹#›</a:t>
+              <a:t>‹Nr.›</a:t>
             </a:fld>
             <a:endParaRPr lang="de-DE"/>
           </a:p>
@@ -4429,7 +4431,7 @@
           <a:p>
             <a:fld id="{E45DED98-5987-4D9A-AB79-D34B0B5CBFCF}" type="slidenum">
               <a:rPr lang="en-US" smtClean="0"/>
-              <a:t>‹#›</a:t>
+              <a:t>‹Nr.›</a:t>
             </a:fld>
             <a:endParaRPr lang="en-US"/>
           </a:p>
@@ -4936,7 +4938,7 @@
                   <a:spcPct val="114000"/>
                 </a:lnSpc>
               </a:pPr>
-              <a:t>‹#›</a:t>
+              <a:t>‹Nr.›</a:t>
             </a:fld>
             <a:endParaRPr lang="de-DE" sz="1600">
               <a:latin typeface="+mn-lt"/>
@@ -5028,7 +5030,7 @@
             <a:fld id="{CE58CB1E-F828-4F11-99E0-327109AF9DA4}" type="slidenum">
               <a:rPr lang="de-DE" smtClean="0"/>
               <a:pPr/>
-              <a:t>‹#›</a:t>
+              <a:t>‹Nr.›</a:t>
             </a:fld>
             <a:endParaRPr lang="de-DE"/>
           </a:p>
@@ -5543,7 +5545,7 @@
             <a:fld id="{CE58CB1E-F828-4F11-99E0-327109AF9DA4}" type="slidenum">
               <a:rPr lang="de-DE" smtClean="0"/>
               <a:pPr/>
-              <a:t>‹#›</a:t>
+              <a:t>‹Nr.›</a:t>
             </a:fld>
             <a:endParaRPr lang="de-DE"/>
           </a:p>
@@ -6267,7 +6269,7 @@
             <a:fld id="{CE58CB1E-F828-4F11-99E0-327109AF9DA4}" type="slidenum">
               <a:rPr lang="de-DE" smtClean="0"/>
               <a:pPr/>
-              <a:t>‹#›</a:t>
+              <a:t>‹Nr.›</a:t>
             </a:fld>
             <a:endParaRPr lang="de-DE"/>
           </a:p>
@@ -6866,7 +6868,7 @@
             <a:fld id="{CE58CB1E-F828-4F11-99E0-327109AF9DA4}" type="slidenum">
               <a:rPr lang="de-DE" smtClean="0"/>
               <a:pPr/>
-              <a:t>‹#›</a:t>
+              <a:t>‹Nr.›</a:t>
             </a:fld>
             <a:endParaRPr lang="de-DE"/>
           </a:p>
@@ -7464,7 +7466,7 @@
             <a:fld id="{CE58CB1E-F828-4F11-99E0-327109AF9DA4}" type="slidenum">
               <a:rPr lang="de-DE" smtClean="0"/>
               <a:pPr/>
-              <a:t>‹#›</a:t>
+              <a:t>‹Nr.›</a:t>
             </a:fld>
             <a:endParaRPr lang="de-DE"/>
           </a:p>
@@ -8093,7 +8095,7 @@
           <a:p>
             <a:fld id="{24EC9E26-044F-425B-9531-88D848027D37}" type="datetimeFigureOut">
               <a:rPr lang="de-DE" smtClean="0"/>
-              <a:t>10.02.2022</a:t>
+              <a:t>21.02.2022</a:t>
             </a:fld>
             <a:endParaRPr lang="de-DE"/>
           </a:p>
@@ -8183,7 +8185,7 @@
           <a:p>
             <a:fld id="{C573EC05-ECC6-4B5F-B877-2754CB1B3596}" type="slidenum">
               <a:rPr lang="de-DE" smtClean="0"/>
-              <a:t>‹#›</a:t>
+              <a:t>‹Nr.›</a:t>
             </a:fld>
             <a:endParaRPr lang="de-DE"/>
           </a:p>
@@ -8748,12 +8750,47 @@
           <a:chExt cx="0" cy="0"/>
         </a:xfrm>
       </p:grpSpPr>
-      <p:sp>
-        <p:nvSpPr>
-          <p:cNvPr id="2" name="Content Placeholder 1">
+      <p:pic>
+        <p:nvPicPr>
+          <p:cNvPr id="13" name="Content Placeholder 12">
             <a:extLst>
               <a:ext uri="{FF2B5EF4-FFF2-40B4-BE49-F238E27FC236}">
-                <a16:creationId xmlns:a16="http://schemas.microsoft.com/office/drawing/2014/main" id="{E5AF5976-9A91-4C1A-8181-DE387496E601}"/>
+                <a16:creationId xmlns:a16="http://schemas.microsoft.com/office/drawing/2014/main" id="{CD758305-EF36-4FF5-82EC-8A6DBBF5DE29}"/>
+              </a:ext>
+            </a:extLst>
+          </p:cNvPr>
+          <p:cNvPicPr>
+            <a:picLocks noGrp="1" noChangeAspect="1"/>
+          </p:cNvPicPr>
+          <p:nvPr>
+            <p:ph idx="1"/>
+          </p:nvPr>
+        </p:nvPicPr>
+        <p:blipFill>
+          <a:blip r:embed="rId2">
+            <a:extLst>
+              <a:ext uri="{28A0092B-C50C-407E-A947-70E740481C1C}">
+                <a14:useLocalDpi xmlns:a14="http://schemas.microsoft.com/office/drawing/2010/main" val="0"/>
+              </a:ext>
+            </a:extLst>
+          </a:blip>
+          <a:stretch>
+            <a:fillRect/>
+          </a:stretch>
+        </p:blipFill>
+        <p:spPr>
+          <a:xfrm>
+            <a:off x="2562738" y="2322872"/>
+            <a:ext cx="6781288" cy="1081532"/>
+          </a:xfrm>
+        </p:spPr>
+      </p:pic>
+      <p:sp>
+        <p:nvSpPr>
+          <p:cNvPr id="10" name="Title 9">
+            <a:extLst>
+              <a:ext uri="{FF2B5EF4-FFF2-40B4-BE49-F238E27FC236}">
+                <a16:creationId xmlns:a16="http://schemas.microsoft.com/office/drawing/2014/main" id="{045FF1FA-A520-42DC-8543-626093AB4C4F}"/>
               </a:ext>
             </a:extLst>
           </p:cNvPr>
@@ -8761,7 +8798,7 @@
             <a:spLocks noGrp="1"/>
           </p:cNvSpPr>
           <p:nvPr>
-            <p:ph idx="1"/>
+            <p:ph type="title"/>
           </p:nvPr>
         </p:nvSpPr>
         <p:spPr/>
@@ -8769,27 +8806,32 @@
           <a:bodyPr/>
           <a:lstStyle/>
           <a:p>
-            <a:pPr marL="342900" indent="-342900">
-              <a:buFont typeface="Arial" panose="020B0604020202020204" pitchFamily="34" charset="0"/>
-              <a:buChar char="•"/>
-            </a:pPr>
-            <a:endParaRPr lang="en-DE" dirty="0"/>
-          </a:p>
-          <a:p>
-            <a:pPr marL="342900" indent="-342900">
-              <a:buFont typeface="Arial" panose="020B0604020202020204" pitchFamily="34" charset="0"/>
-              <a:buChar char="•"/>
-            </a:pPr>
-            <a:endParaRPr lang="de-DE" dirty="0"/>
+            <a:r>
+              <a:rPr lang="de-DE"/>
+              <a:t>Auswertung – W</a:t>
+            </a:r>
+            <a:r>
+              <a:rPr lang="en-DE" err="1"/>
+              <a:t>ichtigste</a:t>
+            </a:r>
+            <a:r>
+              <a:rPr lang="en-DE"/>
+              <a:t> </a:t>
+            </a:r>
+            <a:r>
+              <a:rPr lang="en-DE" err="1"/>
+              <a:t>Resultate</a:t>
+            </a:r>
+            <a:endParaRPr lang="de-DE"/>
           </a:p>
         </p:txBody>
       </p:sp>
       <p:sp>
         <p:nvSpPr>
-          <p:cNvPr id="3" name="Title 2">
+          <p:cNvPr id="3" name="Slide Number Placeholder 2">
             <a:extLst>
               <a:ext uri="{FF2B5EF4-FFF2-40B4-BE49-F238E27FC236}">
-                <a16:creationId xmlns:a16="http://schemas.microsoft.com/office/drawing/2014/main" id="{EB5BDAC7-4187-4F2F-8002-E6B82E000D74}"/>
+                <a16:creationId xmlns:a16="http://schemas.microsoft.com/office/drawing/2014/main" id="{A7B8FAC6-34C2-4AE0-A37F-651E9D939C1B}"/>
               </a:ext>
             </a:extLst>
           </p:cNvPr>
@@ -8797,43 +8839,6 @@
             <a:spLocks noGrp="1"/>
           </p:cNvSpPr>
           <p:nvPr>
-            <p:ph type="title"/>
-          </p:nvPr>
-        </p:nvSpPr>
-        <p:spPr/>
-        <p:txBody>
-          <a:bodyPr/>
-          <a:lstStyle/>
-          <a:p>
-            <a:r>
-              <a:rPr lang="en-DE" dirty="0" err="1"/>
-              <a:t>Abschluss</a:t>
-            </a:r>
-            <a:r>
-              <a:rPr lang="en-DE" dirty="0"/>
-              <a:t> und </a:t>
-            </a:r>
-            <a:r>
-              <a:rPr lang="en-DE" dirty="0" err="1"/>
-              <a:t>Ausblick</a:t>
-            </a:r>
-            <a:endParaRPr lang="de-DE" dirty="0"/>
-          </a:p>
-        </p:txBody>
-      </p:sp>
-      <p:sp>
-        <p:nvSpPr>
-          <p:cNvPr id="4" name="Slide Number Placeholder 3">
-            <a:extLst>
-              <a:ext uri="{FF2B5EF4-FFF2-40B4-BE49-F238E27FC236}">
-                <a16:creationId xmlns:a16="http://schemas.microsoft.com/office/drawing/2014/main" id="{7443C759-79B5-482F-BAAC-40936270FD75}"/>
-              </a:ext>
-            </a:extLst>
-          </p:cNvPr>
-          <p:cNvSpPr>
-            <a:spLocks noGrp="1"/>
-          </p:cNvSpPr>
-          <p:nvPr>
             <p:ph type="sldNum" sz="quarter" idx="11"/>
           </p:nvPr>
         </p:nvSpPr>
@@ -8851,10 +8856,82 @@
           </a:p>
         </p:txBody>
       </p:sp>
+      <p:pic>
+        <p:nvPicPr>
+          <p:cNvPr id="15" name="Picture 14" descr="Table&#10;&#10;Description automatically generated">
+            <a:extLst>
+              <a:ext uri="{FF2B5EF4-FFF2-40B4-BE49-F238E27FC236}">
+                <a16:creationId xmlns:a16="http://schemas.microsoft.com/office/drawing/2014/main" id="{8F38A597-46E4-43B5-AFA5-18415A460EF2}"/>
+              </a:ext>
+            </a:extLst>
+          </p:cNvPr>
+          <p:cNvPicPr>
+            <a:picLocks noChangeAspect="1"/>
+          </p:cNvPicPr>
+          <p:nvPr/>
+        </p:nvPicPr>
+        <p:blipFill>
+          <a:blip r:embed="rId3">
+            <a:extLst>
+              <a:ext uri="{28A0092B-C50C-407E-A947-70E740481C1C}">
+                <a14:useLocalDpi xmlns:a14="http://schemas.microsoft.com/office/drawing/2010/main" val="0"/>
+              </a:ext>
+            </a:extLst>
+          </a:blip>
+          <a:stretch>
+            <a:fillRect/>
+          </a:stretch>
+        </p:blipFill>
+        <p:spPr>
+          <a:xfrm>
+            <a:off x="2562738" y="3600878"/>
+            <a:ext cx="6771682" cy="1080000"/>
+          </a:xfrm>
+          <a:prstGeom prst="rect">
+            <a:avLst/>
+          </a:prstGeom>
+        </p:spPr>
+      </p:pic>
+      <p:pic>
+        <p:nvPicPr>
+          <p:cNvPr id="17" name="Picture 16" descr="Table&#10;&#10;Description automatically generated">
+            <a:extLst>
+              <a:ext uri="{FF2B5EF4-FFF2-40B4-BE49-F238E27FC236}">
+                <a16:creationId xmlns:a16="http://schemas.microsoft.com/office/drawing/2014/main" id="{69391803-E063-43CD-ABD5-2057F005CD5C}"/>
+              </a:ext>
+            </a:extLst>
+          </p:cNvPr>
+          <p:cNvPicPr>
+            <a:picLocks noChangeAspect="1"/>
+          </p:cNvPicPr>
+          <p:nvPr/>
+        </p:nvPicPr>
+        <p:blipFill>
+          <a:blip r:embed="rId4">
+            <a:extLst>
+              <a:ext uri="{28A0092B-C50C-407E-A947-70E740481C1C}">
+                <a14:useLocalDpi xmlns:a14="http://schemas.microsoft.com/office/drawing/2010/main" val="0"/>
+              </a:ext>
+            </a:extLst>
+          </a:blip>
+          <a:stretch>
+            <a:fillRect/>
+          </a:stretch>
+        </p:blipFill>
+        <p:spPr>
+          <a:xfrm>
+            <a:off x="2562738" y="4877352"/>
+            <a:ext cx="6771682" cy="1080000"/>
+          </a:xfrm>
+          <a:prstGeom prst="rect">
+            <a:avLst/>
+          </a:prstGeom>
+        </p:spPr>
+      </p:pic>
     </p:spTree>
     <p:extLst>
       <p:ext uri="{BB962C8B-B14F-4D97-AF65-F5344CB8AC3E}">
-        <p14:creationId xmlns:p14="http://schemas.microsoft.com/office/powerpoint/2010/main" val="1858555817"/>
+        <p14:creationId xmlns:p14="http://schemas.microsoft.com/office/powerpoint/2010/main" val="1434983959"/>
       </p:ext>
     </p:extLst>
   </p:cSld>
@@ -8886,6 +8963,317 @@
           <p:cNvPr id="2" name="Content Placeholder 1">
             <a:extLst>
               <a:ext uri="{FF2B5EF4-FFF2-40B4-BE49-F238E27FC236}">
+                <a16:creationId xmlns:a16="http://schemas.microsoft.com/office/drawing/2014/main" id="{E5AF5976-9A91-4C1A-8181-DE387496E601}"/>
+              </a:ext>
+            </a:extLst>
+          </p:cNvPr>
+          <p:cNvSpPr>
+            <a:spLocks noGrp="1"/>
+          </p:cNvSpPr>
+          <p:nvPr>
+            <p:ph idx="1"/>
+          </p:nvPr>
+        </p:nvSpPr>
+        <p:spPr/>
+        <p:txBody>
+          <a:bodyPr/>
+          <a:lstStyle/>
+          <a:p>
+            <a:pPr marL="342900" indent="-342900">
+              <a:buFont typeface="Arial" panose="020B0604020202020204" pitchFamily="34" charset="0"/>
+              <a:buChar char="•"/>
+            </a:pPr>
+            <a:endParaRPr lang="en-DE" dirty="0"/>
+          </a:p>
+          <a:p>
+            <a:pPr marL="342900" indent="-342900">
+              <a:buFont typeface="Arial" panose="020B0604020202020204" pitchFamily="34" charset="0"/>
+              <a:buChar char="•"/>
+            </a:pPr>
+            <a:r>
+              <a:rPr lang="de-DE" dirty="0"/>
+              <a:t>Das P.K. Verfahren verbessert das vorherige Verfahren aber löst das Oszillationsproblem nicht komplett</a:t>
+            </a:r>
+            <a:endParaRPr lang="en-DE" dirty="0"/>
+          </a:p>
+          <a:p>
+            <a:pPr marL="342900" indent="-342900">
+              <a:buFont typeface="Arial" panose="020B0604020202020204" pitchFamily="34" charset="0"/>
+              <a:buChar char="•"/>
+            </a:pPr>
+            <a:r>
+              <a:rPr lang="en-DE" dirty="0"/>
+              <a:t>Die </a:t>
+            </a:r>
+            <a:r>
+              <a:rPr lang="en-DE" dirty="0" err="1"/>
+              <a:t>komplexere</a:t>
+            </a:r>
+            <a:r>
+              <a:rPr lang="en-DE" dirty="0"/>
+              <a:t> Verfahren  </a:t>
+            </a:r>
+            <a:r>
+              <a:rPr lang="en-DE" dirty="0" err="1"/>
+              <a:t>haben</a:t>
+            </a:r>
+            <a:r>
+              <a:rPr lang="en-DE" dirty="0"/>
+              <a:t> </a:t>
+            </a:r>
+            <a:r>
+              <a:rPr lang="en-DE" dirty="0" err="1"/>
+              <a:t>keinen</a:t>
+            </a:r>
+            <a:r>
+              <a:rPr lang="en-DE" dirty="0"/>
+              <a:t> </a:t>
+            </a:r>
+            <a:r>
+              <a:rPr lang="en-DE" dirty="0" err="1"/>
+              <a:t>Vorteil</a:t>
+            </a:r>
+            <a:r>
+              <a:rPr lang="en-DE" dirty="0"/>
+              <a:t> </a:t>
+            </a:r>
+            <a:r>
+              <a:rPr lang="en-DE" dirty="0" err="1"/>
+              <a:t>mehr</a:t>
+            </a:r>
+            <a:r>
+              <a:rPr lang="en-DE" dirty="0"/>
+              <a:t>, </a:t>
+            </a:r>
+            <a:r>
+              <a:rPr lang="en-DE" dirty="0" err="1"/>
+              <a:t>wenn</a:t>
+            </a:r>
+            <a:r>
+              <a:rPr lang="en-DE" dirty="0"/>
+              <a:t> der </a:t>
+            </a:r>
+            <a:r>
+              <a:rPr lang="en-DE" dirty="0" err="1"/>
+              <a:t>Bedeckungsgrad</a:t>
+            </a:r>
+            <a:r>
+              <a:rPr lang="en-DE" dirty="0"/>
+              <a:t> </a:t>
+            </a:r>
+            <a:r>
+              <a:rPr lang="en-DE" dirty="0" err="1"/>
+              <a:t>aller</a:t>
+            </a:r>
+            <a:r>
+              <a:rPr lang="en-DE" dirty="0"/>
+              <a:t> </a:t>
+            </a:r>
+            <a:r>
+              <a:rPr lang="en-DE" dirty="0" err="1"/>
+              <a:t>Oberflächen</a:t>
+            </a:r>
+            <a:r>
+              <a:rPr lang="en-DE" dirty="0"/>
+              <a:t> </a:t>
+            </a:r>
+            <a:r>
+              <a:rPr lang="en-DE" dirty="0" err="1"/>
+              <a:t>im</a:t>
+            </a:r>
+            <a:r>
+              <a:rPr lang="en-DE" dirty="0"/>
+              <a:t> </a:t>
+            </a:r>
+            <a:r>
+              <a:rPr lang="en-DE" dirty="0" err="1"/>
+              <a:t>Gleichgewicht</a:t>
+            </a:r>
+            <a:r>
+              <a:rPr lang="en-DE" dirty="0"/>
+              <a:t> auf </a:t>
+            </a:r>
+            <a:r>
+              <a:rPr lang="en-DE" dirty="0" err="1"/>
+              <a:t>eins</a:t>
+            </a:r>
+            <a:r>
+              <a:rPr lang="en-DE" dirty="0"/>
+              <a:t> </a:t>
+            </a:r>
+            <a:r>
+              <a:rPr lang="en-DE" dirty="0" err="1"/>
+              <a:t>annähren</a:t>
+            </a:r>
+            <a:endParaRPr lang="de-DE" dirty="0"/>
+          </a:p>
+          <a:p>
+            <a:pPr marL="577845" lvl="1" indent="-342900">
+              <a:buFont typeface="Arial" panose="020B0604020202020204" pitchFamily="34" charset="0"/>
+              <a:buChar char="̶"/>
+            </a:pPr>
+            <a:r>
+              <a:rPr lang="de-DE" dirty="0"/>
+              <a:t>Die maximale Schrittweite muss</a:t>
+            </a:r>
+            <a:r>
+              <a:rPr lang="en-DE" dirty="0"/>
+              <a:t> </a:t>
+            </a:r>
+            <a:r>
+              <a:rPr lang="en-DE" dirty="0" err="1"/>
+              <a:t>immer</a:t>
+            </a:r>
+            <a:r>
+              <a:rPr lang="en-DE" dirty="0"/>
+              <a:t> </a:t>
+            </a:r>
+            <a:r>
+              <a:rPr lang="en-DE" dirty="0" err="1"/>
+              <a:t>noch</a:t>
+            </a:r>
+            <a:r>
+              <a:rPr lang="de-DE" dirty="0"/>
+              <a:t> vernünftig begrenzt werden</a:t>
+            </a:r>
+          </a:p>
+          <a:p>
+            <a:pPr marL="577845" lvl="1" indent="-342900">
+              <a:buFont typeface="Arial" panose="020B0604020202020204" pitchFamily="34" charset="0"/>
+              <a:buChar char="̶"/>
+            </a:pPr>
+            <a:endParaRPr lang="de-DE" dirty="0"/>
+          </a:p>
+          <a:p>
+            <a:pPr marL="342900" indent="-342900">
+              <a:buFont typeface="Arial" panose="020B0604020202020204" pitchFamily="34" charset="0"/>
+              <a:buChar char="•"/>
+            </a:pPr>
+            <a:r>
+              <a:rPr lang="de-DE" dirty="0"/>
+              <a:t>Ist die Anwendung eines Algorithmus zum numerischen Lösen der DGLs in dieser Simulation zielführend?</a:t>
+            </a:r>
+          </a:p>
+          <a:p>
+            <a:pPr marL="577845" lvl="1" indent="-342900">
+              <a:buFont typeface="Arial" panose="020B0604020202020204" pitchFamily="34" charset="0"/>
+              <a:buChar char="̶"/>
+            </a:pPr>
+            <a:r>
+              <a:rPr lang="de-DE" dirty="0"/>
+              <a:t>Eventuell soll ein anderes P.K. Verfahren, das für die ereignisgesteuerten Simulationen besser geeignet ist, benutzt werden</a:t>
+            </a:r>
+          </a:p>
+          <a:p>
+            <a:pPr lvl="1" indent="0">
+              <a:buNone/>
+            </a:pPr>
+            <a:endParaRPr lang="de-DE" dirty="0"/>
+          </a:p>
+        </p:txBody>
+      </p:sp>
+      <p:sp>
+        <p:nvSpPr>
+          <p:cNvPr id="3" name="Title 2">
+            <a:extLst>
+              <a:ext uri="{FF2B5EF4-FFF2-40B4-BE49-F238E27FC236}">
+                <a16:creationId xmlns:a16="http://schemas.microsoft.com/office/drawing/2014/main" id="{EB5BDAC7-4187-4F2F-8002-E6B82E000D74}"/>
+              </a:ext>
+            </a:extLst>
+          </p:cNvPr>
+          <p:cNvSpPr>
+            <a:spLocks noGrp="1"/>
+          </p:cNvSpPr>
+          <p:nvPr>
+            <p:ph type="title"/>
+          </p:nvPr>
+        </p:nvSpPr>
+        <p:spPr/>
+        <p:txBody>
+          <a:bodyPr/>
+          <a:lstStyle/>
+          <a:p>
+            <a:r>
+              <a:rPr lang="en-DE" dirty="0" err="1"/>
+              <a:t>Abschluss</a:t>
+            </a:r>
+            <a:r>
+              <a:rPr lang="en-DE" dirty="0"/>
+              <a:t> und </a:t>
+            </a:r>
+            <a:r>
+              <a:rPr lang="en-DE" dirty="0" err="1"/>
+              <a:t>Ausblick</a:t>
+            </a:r>
+            <a:endParaRPr lang="de-DE" dirty="0"/>
+          </a:p>
+        </p:txBody>
+      </p:sp>
+      <p:sp>
+        <p:nvSpPr>
+          <p:cNvPr id="4" name="Slide Number Placeholder 3">
+            <a:extLst>
+              <a:ext uri="{FF2B5EF4-FFF2-40B4-BE49-F238E27FC236}">
+                <a16:creationId xmlns:a16="http://schemas.microsoft.com/office/drawing/2014/main" id="{7443C759-79B5-482F-BAAC-40936270FD75}"/>
+              </a:ext>
+            </a:extLst>
+          </p:cNvPr>
+          <p:cNvSpPr>
+            <a:spLocks noGrp="1"/>
+          </p:cNvSpPr>
+          <p:nvPr>
+            <p:ph type="sldNum" sz="quarter" idx="11"/>
+          </p:nvPr>
+        </p:nvSpPr>
+        <p:spPr/>
+        <p:txBody>
+          <a:bodyPr/>
+          <a:lstStyle/>
+          <a:p>
+            <a:fld id="{CE58CB1E-F828-4F11-99E0-327109AF9DA4}" type="slidenum">
+              <a:rPr lang="de-DE" smtClean="0"/>
+              <a:pPr/>
+              <a:t>11</a:t>
+            </a:fld>
+            <a:endParaRPr lang="de-DE"/>
+          </a:p>
+        </p:txBody>
+      </p:sp>
+    </p:spTree>
+    <p:extLst>
+      <p:ext uri="{BB962C8B-B14F-4D97-AF65-F5344CB8AC3E}">
+        <p14:creationId xmlns:p14="http://schemas.microsoft.com/office/powerpoint/2010/main" val="1858555817"/>
+      </p:ext>
+    </p:extLst>
+  </p:cSld>
+  <p:clrMapOvr>
+    <a:masterClrMapping/>
+  </p:clrMapOvr>
+</p:sld>
+</file>
+
+<file path=ppt/slides/slide12.xml><?xml version="1.0" encoding="utf-8"?>
+<p:sld xmlns:a="http://schemas.openxmlformats.org/drawingml/2006/main" xmlns:r="http://schemas.openxmlformats.org/officeDocument/2006/relationships" xmlns:p="http://schemas.openxmlformats.org/presentationml/2006/main">
+  <p:cSld>
+    <p:spTree>
+      <p:nvGrpSpPr>
+        <p:cNvPr id="1" name=""/>
+        <p:cNvGrpSpPr/>
+        <p:nvPr/>
+      </p:nvGrpSpPr>
+      <p:grpSpPr>
+        <a:xfrm>
+          <a:off x="0" y="0"/>
+          <a:ext cx="0" cy="0"/>
+          <a:chOff x="0" y="0"/>
+          <a:chExt cx="0" cy="0"/>
+        </a:xfrm>
+      </p:grpSpPr>
+      <p:sp>
+        <p:nvSpPr>
+          <p:cNvPr id="2" name="Content Placeholder 1">
+            <a:extLst>
+              <a:ext uri="{FF2B5EF4-FFF2-40B4-BE49-F238E27FC236}">
                 <a16:creationId xmlns:a16="http://schemas.microsoft.com/office/drawing/2014/main" id="{6288EBA5-A72F-4BEC-AF0C-C00F0EEDF787}"/>
               </a:ext>
             </a:extLst>
@@ -9008,7 +9396,7 @@
             <a:fld id="{CE58CB1E-F828-4F11-99E0-327109AF9DA4}" type="slidenum">
               <a:rPr lang="de-DE" smtClean="0"/>
               <a:pPr/>
-              <a:t>11</a:t>
+              <a:t>12</a:t>
             </a:fld>
             <a:endParaRPr lang="de-DE"/>
           </a:p>
@@ -9018,6 +9406,87 @@
     <p:extLst>
       <p:ext uri="{BB962C8B-B14F-4D97-AF65-F5344CB8AC3E}">
         <p14:creationId xmlns:p14="http://schemas.microsoft.com/office/powerpoint/2010/main" val="4050613255"/>
+      </p:ext>
+    </p:extLst>
+  </p:cSld>
+  <p:clrMapOvr>
+    <a:masterClrMapping/>
+  </p:clrMapOvr>
+</p:sld>
+</file>
+
+<file path=ppt/slides/slide13.xml><?xml version="1.0" encoding="utf-8"?>
+<p:sld xmlns:a="http://schemas.openxmlformats.org/drawingml/2006/main" xmlns:r="http://schemas.openxmlformats.org/officeDocument/2006/relationships" xmlns:p="http://schemas.openxmlformats.org/presentationml/2006/main">
+  <p:cSld>
+    <p:spTree>
+      <p:nvGrpSpPr>
+        <p:cNvPr id="1" name=""/>
+        <p:cNvGrpSpPr/>
+        <p:nvPr/>
+      </p:nvGrpSpPr>
+      <p:grpSpPr>
+        <a:xfrm>
+          <a:off x="0" y="0"/>
+          <a:ext cx="0" cy="0"/>
+          <a:chOff x="0" y="0"/>
+          <a:chExt cx="0" cy="0"/>
+        </a:xfrm>
+      </p:grpSpPr>
+      <p:sp>
+        <p:nvSpPr>
+          <p:cNvPr id="3" name="Title 2">
+            <a:extLst>
+              <a:ext uri="{FF2B5EF4-FFF2-40B4-BE49-F238E27FC236}">
+                <a16:creationId xmlns:a16="http://schemas.microsoft.com/office/drawing/2014/main" id="{0D5E1620-1EB4-471F-87CA-A7657DDB1573}"/>
+              </a:ext>
+            </a:extLst>
+          </p:cNvPr>
+          <p:cNvSpPr>
+            <a:spLocks noGrp="1"/>
+          </p:cNvSpPr>
+          <p:nvPr>
+            <p:ph type="title"/>
+          </p:nvPr>
+        </p:nvSpPr>
+        <p:spPr>
+          <a:xfrm>
+            <a:off x="423334" y="3173546"/>
+            <a:ext cx="11345332" cy="510909"/>
+          </a:xfrm>
+        </p:spPr>
+        <p:txBody>
+          <a:bodyPr/>
+          <a:lstStyle/>
+          <a:p>
+            <a:pPr algn="ctr"/>
+            <a:r>
+              <a:rPr lang="en-GB" dirty="0" err="1"/>
+              <a:t>Vielen</a:t>
+            </a:r>
+            <a:r>
+              <a:rPr lang="en-GB" dirty="0"/>
+              <a:t> Dank für </a:t>
+            </a:r>
+            <a:r>
+              <a:rPr lang="en-GB" dirty="0" err="1"/>
+              <a:t>Ihre</a:t>
+            </a:r>
+            <a:r>
+              <a:rPr lang="en-GB" dirty="0"/>
+              <a:t> </a:t>
+            </a:r>
+            <a:r>
+              <a:rPr lang="en-GB" dirty="0" err="1"/>
+              <a:t>Aufmerksamkeit</a:t>
+            </a:r>
+            <a:endParaRPr lang="en-DE" dirty="0"/>
+          </a:p>
+        </p:txBody>
+      </p:sp>
+    </p:spTree>
+    <p:extLst>
+      <p:ext uri="{BB962C8B-B14F-4D97-AF65-F5344CB8AC3E}">
+        <p14:creationId xmlns:p14="http://schemas.microsoft.com/office/powerpoint/2010/main" val="421938047"/>
       </p:ext>
     </p:extLst>
   </p:cSld>
@@ -9070,17 +9539,18 @@
               <a:buChar char="•"/>
             </a:pPr>
             <a:r>
+              <a:rPr lang="de-DE" dirty="0"/>
+              <a:t>Oszillation</a:t>
+            </a:r>
+            <a:r>
               <a:rPr lang="en-DE" dirty="0"/>
-              <a:t>(</a:t>
+              <a:t> der </a:t>
             </a:r>
             <a:r>
               <a:rPr lang="en-DE" dirty="0" err="1"/>
-              <a:t>Hintergrund</a:t>
-            </a:r>
-            <a:r>
-              <a:rPr lang="en-DE" dirty="0"/>
-              <a:t> ?)</a:t>
-            </a:r>
+              <a:t>Simulationsergebnisse</a:t>
+            </a:r>
+            <a:endParaRPr lang="en-DE" dirty="0"/>
           </a:p>
           <a:p>
             <a:pPr marL="342900" indent="-342900">
@@ -9089,17 +9559,8 @@
             </a:pPr>
             <a:r>
               <a:rPr lang="de-DE" dirty="0"/>
-              <a:t>Oszillation</a:t>
-            </a:r>
-            <a:r>
-              <a:rPr lang="en-DE" dirty="0"/>
-              <a:t> der </a:t>
-            </a:r>
-            <a:r>
-              <a:rPr lang="en-DE" dirty="0" err="1"/>
-              <a:t>Simulationsergebnisse</a:t>
-            </a:r>
-            <a:endParaRPr lang="en-DE" dirty="0"/>
+              <a:t>Motivation für das Prädiktor-Korrektor-Verfahren</a:t>
+            </a:r>
           </a:p>
           <a:p>
             <a:pPr marL="342900" indent="-342900">
@@ -9108,7 +9569,7 @@
             </a:pPr>
             <a:r>
               <a:rPr lang="de-DE" dirty="0"/>
-              <a:t>Motivation für das Prädiktor-Korrektor-Verfahren</a:t>
+              <a:t>Implementierung</a:t>
             </a:r>
           </a:p>
           <a:p>
@@ -9117,25 +9578,6 @@
               <a:buChar char="•"/>
             </a:pPr>
             <a:r>
-              <a:rPr lang="en-DE" dirty="0"/>
-              <a:t>(</a:t>
-            </a:r>
-            <a:r>
-              <a:rPr lang="de-DE" dirty="0"/>
-              <a:t>Implementierung ?</a:t>
-            </a:r>
-            <a:r>
-              <a:rPr lang="en-DE" dirty="0"/>
-              <a:t>)</a:t>
-            </a:r>
-            <a:endParaRPr lang="de-DE" dirty="0"/>
-          </a:p>
-          <a:p>
-            <a:pPr marL="342900" indent="-342900">
-              <a:buFont typeface="Arial" panose="020B0604020202020204" pitchFamily="34" charset="0"/>
-              <a:buChar char="•"/>
-            </a:pPr>
-            <a:r>
               <a:rPr lang="de-DE" dirty="0"/>
               <a:t>Auswertung</a:t>
             </a:r>
@@ -9210,6 +9652,30 @@
                 <a:sym typeface="Symbol" panose="05050102010706020507" pitchFamily="18" charset="2"/>
               </a:rPr>
               <a:t> = 5.0</a:t>
+            </a:r>
+          </a:p>
+          <a:p>
+            <a:pPr marL="577845" lvl="1" indent="-342900">
+              <a:buFont typeface="Symbol" panose="05050102010706020507" pitchFamily="18" charset="2"/>
+              <a:buChar char="-"/>
+            </a:pPr>
+            <a:r>
+              <a:rPr lang="en-DE" dirty="0" err="1">
+                <a:sym typeface="Symbol" panose="05050102010706020507" pitchFamily="18" charset="2"/>
+              </a:rPr>
+              <a:t>Wichtigste</a:t>
+            </a:r>
+            <a:r>
+              <a:rPr lang="en-DE" dirty="0">
+                <a:sym typeface="Symbol" panose="05050102010706020507" pitchFamily="18" charset="2"/>
+              </a:rPr>
+              <a:t> </a:t>
+            </a:r>
+            <a:r>
+              <a:rPr lang="en-DE" dirty="0" err="1">
+                <a:sym typeface="Symbol" panose="05050102010706020507" pitchFamily="18" charset="2"/>
+              </a:rPr>
+              <a:t>Resultate</a:t>
             </a:r>
             <a:endParaRPr lang="de-DE" dirty="0"/>
           </a:p>
@@ -9727,6 +10193,224 @@
 </file>
 
 <file path=ppt/slides/slide5.xml><?xml version="1.0" encoding="utf-8"?>
+<p:sld xmlns:a="http://schemas.openxmlformats.org/drawingml/2006/main" xmlns:r="http://schemas.openxmlformats.org/officeDocument/2006/relationships" xmlns:p="http://schemas.openxmlformats.org/presentationml/2006/main">
+  <p:cSld>
+    <p:spTree>
+      <p:nvGrpSpPr>
+        <p:cNvPr id="1" name=""/>
+        <p:cNvGrpSpPr/>
+        <p:nvPr/>
+      </p:nvGrpSpPr>
+      <p:grpSpPr>
+        <a:xfrm>
+          <a:off x="0" y="0"/>
+          <a:ext cx="0" cy="0"/>
+          <a:chOff x="0" y="0"/>
+          <a:chExt cx="0" cy="0"/>
+        </a:xfrm>
+      </p:grpSpPr>
+      <p:sp>
+        <p:nvSpPr>
+          <p:cNvPr id="4" name="Title 3">
+            <a:extLst>
+              <a:ext uri="{FF2B5EF4-FFF2-40B4-BE49-F238E27FC236}">
+                <a16:creationId xmlns:a16="http://schemas.microsoft.com/office/drawing/2014/main" id="{34700673-A672-48CB-9EAB-06152391C187}"/>
+              </a:ext>
+            </a:extLst>
+          </p:cNvPr>
+          <p:cNvSpPr>
+            <a:spLocks noGrp="1"/>
+          </p:cNvSpPr>
+          <p:nvPr>
+            <p:ph type="title"/>
+          </p:nvPr>
+        </p:nvSpPr>
+        <p:spPr/>
+        <p:txBody>
+          <a:bodyPr/>
+          <a:lstStyle/>
+          <a:p>
+            <a:r>
+              <a:rPr lang="en-GB" dirty="0" err="1"/>
+              <a:t>Implementierung</a:t>
+            </a:r>
+            <a:endParaRPr lang="en-DE" dirty="0"/>
+          </a:p>
+        </p:txBody>
+      </p:sp>
+      <p:sp>
+        <p:nvSpPr>
+          <p:cNvPr id="5" name="Slide Number Placeholder 4">
+            <a:extLst>
+              <a:ext uri="{FF2B5EF4-FFF2-40B4-BE49-F238E27FC236}">
+                <a16:creationId xmlns:a16="http://schemas.microsoft.com/office/drawing/2014/main" id="{4D00A7A0-5B61-411D-B395-1DF4840B8490}"/>
+              </a:ext>
+            </a:extLst>
+          </p:cNvPr>
+          <p:cNvSpPr>
+            <a:spLocks noGrp="1"/>
+          </p:cNvSpPr>
+          <p:nvPr>
+            <p:ph type="sldNum" sz="quarter" idx="16"/>
+          </p:nvPr>
+        </p:nvSpPr>
+        <p:spPr/>
+        <p:txBody>
+          <a:bodyPr/>
+          <a:lstStyle/>
+          <a:p>
+            <a:fld id="{CE58CB1E-F828-4F11-99E0-327109AF9DA4}" type="slidenum">
+              <a:rPr lang="de-DE" smtClean="0"/>
+              <a:pPr/>
+              <a:t>5</a:t>
+            </a:fld>
+            <a:endParaRPr lang="de-DE"/>
+          </a:p>
+        </p:txBody>
+      </p:sp>
+      <p:sp>
+        <p:nvSpPr>
+          <p:cNvPr id="12" name="Rett linje 11">
+            <a:extLst>
+              <a:ext uri="{FF2B5EF4-FFF2-40B4-BE49-F238E27FC236}">
+                <a16:creationId xmlns:a16="http://schemas.microsoft.com/office/drawing/2014/main" id="{9E970B38-0E72-4831-B5DE-A5634C1BE875}"/>
+              </a:ext>
+            </a:extLst>
+          </p:cNvPr>
+          <p:cNvSpPr/>
+          <p:nvPr/>
+        </p:nvSpPr>
+        <p:spPr>
+          <a:xfrm rot="5400000">
+            <a:off x="4186835" y="4118279"/>
+            <a:ext cx="4166647" cy="6286"/>
+          </a:xfrm>
+          <a:prstGeom prst="line">
+            <a:avLst/>
+          </a:prstGeom>
+          <a:ln/>
+        </p:spPr>
+        <p:style>
+          <a:lnRef idx="3">
+            <a:schemeClr val="dk1"/>
+          </a:lnRef>
+          <a:fillRef idx="0">
+            <a:schemeClr val="dk1"/>
+          </a:fillRef>
+          <a:effectRef idx="2">
+            <a:schemeClr val="dk1"/>
+          </a:effectRef>
+          <a:fontRef idx="minor">
+            <a:schemeClr val="tx1"/>
+          </a:fontRef>
+        </p:style>
+        <p:txBody>
+          <a:bodyPr wrap="square" lIns="0" tIns="0" rIns="0" bIns="0" rtlCol="0" anchor="ctr" anchorCtr="1">
+            <a:spAutoFit/>
+          </a:bodyPr>
+          <a:lstStyle/>
+          <a:p>
+            <a:pPr>
+              <a:lnSpc>
+                <a:spcPct val="114000"/>
+              </a:lnSpc>
+              <a:defRPr sz="1600" dirty="0" err="1" smtClean="0">
+                <a:latin typeface="+mn-lt"/>
+              </a:defRPr>
+            </a:pPr>
+            <a:endParaRPr lang="en-US" sz="1600" dirty="0" err="1">
+              <a:solidFill>
+                <a:srgbClr val="000000"/>
+              </a:solidFill>
+              <a:latin typeface="+mn-lt"/>
+            </a:endParaRPr>
+          </a:p>
+        </p:txBody>
+      </p:sp>
+      <p:pic>
+        <p:nvPicPr>
+          <p:cNvPr id="14" name="Inhaltsplatzhalter 13">
+            <a:extLst>
+              <a:ext uri="{FF2B5EF4-FFF2-40B4-BE49-F238E27FC236}">
+                <a16:creationId xmlns:a16="http://schemas.microsoft.com/office/drawing/2014/main" id="{BC06C53F-90F2-4B14-A645-D898EEB43A36}"/>
+              </a:ext>
+            </a:extLst>
+          </p:cNvPr>
+          <p:cNvPicPr>
+            <a:picLocks noGrp="1" noChangeAspect="1"/>
+          </p:cNvPicPr>
+          <p:nvPr>
+            <p:ph idx="15"/>
+          </p:nvPr>
+        </p:nvPicPr>
+        <p:blipFill>
+          <a:blip r:embed="rId2">
+            <a:extLst>
+              <a:ext uri="{28A0092B-C50C-407E-A947-70E740481C1C}">
+                <a14:useLocalDpi xmlns:a14="http://schemas.microsoft.com/office/drawing/2010/main" val="0"/>
+              </a:ext>
+            </a:extLst>
+          </a:blip>
+          <a:stretch>
+            <a:fillRect/>
+          </a:stretch>
+        </p:blipFill>
+        <p:spPr>
+          <a:xfrm>
+            <a:off x="6516125" y="2732909"/>
+            <a:ext cx="5408687" cy="2935230"/>
+          </a:xfrm>
+        </p:spPr>
+      </p:pic>
+      <p:pic>
+        <p:nvPicPr>
+          <p:cNvPr id="18" name="Inhaltsplatzhalter 17">
+            <a:extLst>
+              <a:ext uri="{FF2B5EF4-FFF2-40B4-BE49-F238E27FC236}">
+                <a16:creationId xmlns:a16="http://schemas.microsoft.com/office/drawing/2014/main" id="{4BF7AD80-E005-4B6D-8D52-9ECCB5B24D4D}"/>
+              </a:ext>
+            </a:extLst>
+          </p:cNvPr>
+          <p:cNvPicPr>
+            <a:picLocks noGrp="1" noChangeAspect="1"/>
+          </p:cNvPicPr>
+          <p:nvPr>
+            <p:ph idx="14"/>
+          </p:nvPr>
+        </p:nvPicPr>
+        <p:blipFill>
+          <a:blip r:embed="rId3">
+            <a:extLst>
+              <a:ext uri="{28A0092B-C50C-407E-A947-70E740481C1C}">
+                <a14:useLocalDpi xmlns:a14="http://schemas.microsoft.com/office/drawing/2010/main" val="0"/>
+              </a:ext>
+            </a:extLst>
+          </a:blip>
+          <a:stretch>
+            <a:fillRect/>
+          </a:stretch>
+        </p:blipFill>
+        <p:spPr>
+          <a:xfrm>
+            <a:off x="425450" y="2447785"/>
+            <a:ext cx="5575300" cy="3505480"/>
+          </a:xfrm>
+        </p:spPr>
+      </p:pic>
+    </p:spTree>
+    <p:extLst>
+      <p:ext uri="{BB962C8B-B14F-4D97-AF65-F5344CB8AC3E}">
+        <p14:creationId xmlns:p14="http://schemas.microsoft.com/office/powerpoint/2010/main" val="4225002656"/>
+      </p:ext>
+    </p:extLst>
+  </p:cSld>
+  <p:clrMapOvr>
+    <a:masterClrMapping/>
+  </p:clrMapOvr>
+</p:sld>
+</file>
+
+<file path=ppt/slides/slide6.xml><?xml version="1.0" encoding="utf-8"?>
 <p:sld xmlns:a="http://schemas.openxmlformats.org/drawingml/2006/main" xmlns:r="http://schemas.openxmlformats.org/officeDocument/2006/relationships" xmlns:p="http://schemas.openxmlformats.org/presentationml/2006/main">
   <p:cSld>
     <p:spTree>
@@ -10014,7 +10698,7 @@
             <a:fld id="{CE58CB1E-F828-4F11-99E0-327109AF9DA4}" type="slidenum">
               <a:rPr lang="de-DE" smtClean="0"/>
               <a:pPr/>
-              <a:t>5</a:t>
+              <a:t>6</a:t>
             </a:fld>
             <a:endParaRPr lang="de-DE"/>
           </a:p>
@@ -10024,301 +10708,6 @@
     <p:extLst>
       <p:ext uri="{BB962C8B-B14F-4D97-AF65-F5344CB8AC3E}">
         <p14:creationId xmlns:p14="http://schemas.microsoft.com/office/powerpoint/2010/main" val="1261008912"/>
-      </p:ext>
-    </p:extLst>
-  </p:cSld>
-  <p:clrMapOvr>
-    <a:masterClrMapping/>
-  </p:clrMapOvr>
-</p:sld>
-</file>
-
-<file path=ppt/slides/slide6.xml><?xml version="1.0" encoding="utf-8"?>
-<p:sld xmlns:a="http://schemas.openxmlformats.org/drawingml/2006/main" xmlns:r="http://schemas.openxmlformats.org/officeDocument/2006/relationships" xmlns:p="http://schemas.openxmlformats.org/presentationml/2006/main">
-  <p:cSld>
-    <p:spTree>
-      <p:nvGrpSpPr>
-        <p:cNvPr id="1" name=""/>
-        <p:cNvGrpSpPr/>
-        <p:nvPr/>
-      </p:nvGrpSpPr>
-      <p:grpSpPr>
-        <a:xfrm>
-          <a:off x="0" y="0"/>
-          <a:ext cx="0" cy="0"/>
-          <a:chOff x="0" y="0"/>
-          <a:chExt cx="0" cy="0"/>
-        </a:xfrm>
-      </p:grpSpPr>
-      <p:sp>
-        <p:nvSpPr>
-          <p:cNvPr id="4" name="Title 3">
-            <a:extLst>
-              <a:ext uri="{FF2B5EF4-FFF2-40B4-BE49-F238E27FC236}">
-                <a16:creationId xmlns:a16="http://schemas.microsoft.com/office/drawing/2014/main" id="{ED5AAF87-5132-49A2-BA4B-F60CA9B9AE29}"/>
-              </a:ext>
-            </a:extLst>
-          </p:cNvPr>
-          <p:cNvSpPr>
-            <a:spLocks noGrp="1"/>
-          </p:cNvSpPr>
-          <p:nvPr>
-            <p:ph type="title"/>
-          </p:nvPr>
-        </p:nvSpPr>
-        <p:spPr>
-          <a:xfrm>
-            <a:off x="425454" y="1296001"/>
-            <a:ext cx="11345332" cy="1062342"/>
-          </a:xfrm>
-        </p:spPr>
-        <p:txBody>
-          <a:bodyPr/>
-          <a:lstStyle/>
-          <a:p>
-            <a:r>
-              <a:rPr lang="de-DE"/>
-              <a:t>Auswertung - Sulationsergebnisse</a:t>
-            </a:r>
-            <a:r>
-              <a:rPr lang="en-DE"/>
-              <a:t> für </a:t>
-            </a:r>
-            <a:r>
-              <a:rPr lang="en-DE">
-                <a:sym typeface="Symbol" panose="05050102010706020507" pitchFamily="18" charset="2"/>
-              </a:rPr>
-              <a:t> = 2.0</a:t>
-            </a:r>
-            <a:br>
-              <a:rPr lang="en-DE">
-                <a:sym typeface="Symbol" panose="05050102010706020507" pitchFamily="18" charset="2"/>
-              </a:rPr>
-            </a:br>
-            <a:endParaRPr lang="de-DE"/>
-          </a:p>
-        </p:txBody>
-      </p:sp>
-      <p:sp>
-        <p:nvSpPr>
-          <p:cNvPr id="5" name="Slide Number Placeholder 4">
-            <a:extLst>
-              <a:ext uri="{FF2B5EF4-FFF2-40B4-BE49-F238E27FC236}">
-                <a16:creationId xmlns:a16="http://schemas.microsoft.com/office/drawing/2014/main" id="{FE4D06CA-9DA8-44D5-B15F-AAA999F7CDFA}"/>
-              </a:ext>
-            </a:extLst>
-          </p:cNvPr>
-          <p:cNvSpPr>
-            <a:spLocks noGrp="1"/>
-          </p:cNvSpPr>
-          <p:nvPr>
-            <p:ph type="sldNum" sz="quarter" idx="11"/>
-          </p:nvPr>
-        </p:nvSpPr>
-        <p:spPr/>
-        <p:txBody>
-          <a:bodyPr/>
-          <a:lstStyle/>
-          <a:p>
-            <a:fld id="{CE58CB1E-F828-4F11-99E0-327109AF9DA4}" type="slidenum">
-              <a:rPr lang="de-DE" smtClean="0"/>
-              <a:pPr/>
-              <a:t>6</a:t>
-            </a:fld>
-            <a:endParaRPr lang="de-DE"/>
-          </a:p>
-        </p:txBody>
-      </p:sp>
-      <p:pic>
-        <p:nvPicPr>
-          <p:cNvPr id="44" name="Picture Placeholder 43" descr="Chart&#10;&#10;Description automatically generated">
-            <a:extLst>
-              <a:ext uri="{FF2B5EF4-FFF2-40B4-BE49-F238E27FC236}">
-                <a16:creationId xmlns:a16="http://schemas.microsoft.com/office/drawing/2014/main" id="{B0BB5178-E834-4179-8F28-4B945C74CB99}"/>
-              </a:ext>
-            </a:extLst>
-          </p:cNvPr>
-          <p:cNvPicPr>
-            <a:picLocks noGrp="1" noChangeAspect="1"/>
-          </p:cNvPicPr>
-          <p:nvPr>
-            <p:ph type="pic" sz="quarter" idx="12"/>
-          </p:nvPr>
-        </p:nvPicPr>
-        <p:blipFill>
-          <a:blip r:embed="rId3">
-            <a:extLst>
-              <a:ext uri="{28A0092B-C50C-407E-A947-70E740481C1C}">
-                <a14:useLocalDpi xmlns:a14="http://schemas.microsoft.com/office/drawing/2010/main" val="0"/>
-              </a:ext>
-            </a:extLst>
-          </a:blip>
-          <a:srcRect l="2896" r="2896"/>
-          <a:stretch>
-            <a:fillRect/>
-          </a:stretch>
-        </p:blipFill>
-        <p:spPr/>
-      </p:pic>
-      <p:pic>
-        <p:nvPicPr>
-          <p:cNvPr id="42" name="Picture Placeholder 41" descr="Chart, line chart&#10;&#10;Description automatically generated">
-            <a:extLst>
-              <a:ext uri="{FF2B5EF4-FFF2-40B4-BE49-F238E27FC236}">
-                <a16:creationId xmlns:a16="http://schemas.microsoft.com/office/drawing/2014/main" id="{A8ED02AC-770B-40E0-A8D8-9E54ACB0EF4D}"/>
-              </a:ext>
-            </a:extLst>
-          </p:cNvPr>
-          <p:cNvPicPr>
-            <a:picLocks noGrp="1" noChangeAspect="1"/>
-          </p:cNvPicPr>
-          <p:nvPr>
-            <p:ph type="pic" sz="quarter" idx="13"/>
-          </p:nvPr>
-        </p:nvPicPr>
-        <p:blipFill>
-          <a:blip r:embed="rId4">
-            <a:extLst>
-              <a:ext uri="{28A0092B-C50C-407E-A947-70E740481C1C}">
-                <a14:useLocalDpi xmlns:a14="http://schemas.microsoft.com/office/drawing/2010/main" val="0"/>
-              </a:ext>
-            </a:extLst>
-          </a:blip>
-          <a:srcRect l="2896" r="2896"/>
-          <a:stretch>
-            <a:fillRect/>
-          </a:stretch>
-        </p:blipFill>
-        <p:spPr/>
-      </p:pic>
-      <p:pic>
-        <p:nvPicPr>
-          <p:cNvPr id="48" name="Picture Placeholder 47" descr="Chart&#10;&#10;Description automatically generated">
-            <a:extLst>
-              <a:ext uri="{FF2B5EF4-FFF2-40B4-BE49-F238E27FC236}">
-                <a16:creationId xmlns:a16="http://schemas.microsoft.com/office/drawing/2014/main" id="{F9ECFC26-2988-4BB6-9660-1CE3A8FC40F4}"/>
-              </a:ext>
-            </a:extLst>
-          </p:cNvPr>
-          <p:cNvPicPr>
-            <a:picLocks noGrp="1" noChangeAspect="1"/>
-          </p:cNvPicPr>
-          <p:nvPr>
-            <p:ph type="pic" sz="quarter" idx="14"/>
-          </p:nvPr>
-        </p:nvPicPr>
-        <p:blipFill>
-          <a:blip r:embed="rId5">
-            <a:extLst>
-              <a:ext uri="{28A0092B-C50C-407E-A947-70E740481C1C}">
-                <a14:useLocalDpi xmlns:a14="http://schemas.microsoft.com/office/drawing/2010/main" val="0"/>
-              </a:ext>
-            </a:extLst>
-          </a:blip>
-          <a:srcRect l="2872" r="2872"/>
-          <a:stretch>
-            <a:fillRect/>
-          </a:stretch>
-        </p:blipFill>
-        <p:spPr/>
-      </p:pic>
-      <p:pic>
-        <p:nvPicPr>
-          <p:cNvPr id="46" name="Picture Placeholder 45" descr="Chart, line chart&#10;&#10;Description automatically generated">
-            <a:extLst>
-              <a:ext uri="{FF2B5EF4-FFF2-40B4-BE49-F238E27FC236}">
-                <a16:creationId xmlns:a16="http://schemas.microsoft.com/office/drawing/2014/main" id="{59DDE538-A775-445A-A8BF-A9F54243D1E0}"/>
-              </a:ext>
-            </a:extLst>
-          </p:cNvPr>
-          <p:cNvPicPr>
-            <a:picLocks noGrp="1" noChangeAspect="1"/>
-          </p:cNvPicPr>
-          <p:nvPr>
-            <p:ph type="pic" sz="quarter" idx="15"/>
-          </p:nvPr>
-        </p:nvPicPr>
-        <p:blipFill>
-          <a:blip r:embed="rId6">
-            <a:extLst>
-              <a:ext uri="{28A0092B-C50C-407E-A947-70E740481C1C}">
-                <a14:useLocalDpi xmlns:a14="http://schemas.microsoft.com/office/drawing/2010/main" val="0"/>
-              </a:ext>
-            </a:extLst>
-          </a:blip>
-          <a:srcRect l="2872" r="2872"/>
-          <a:stretch>
-            <a:fillRect/>
-          </a:stretch>
-        </p:blipFill>
-        <p:spPr/>
-      </p:pic>
-      <p:pic>
-        <p:nvPicPr>
-          <p:cNvPr id="52" name="Picture Placeholder 51" descr="Chart&#10;&#10;Description automatically generated">
-            <a:extLst>
-              <a:ext uri="{FF2B5EF4-FFF2-40B4-BE49-F238E27FC236}">
-                <a16:creationId xmlns:a16="http://schemas.microsoft.com/office/drawing/2014/main" id="{3ABCE787-6C5A-47FA-9ED9-3A1631960BA8}"/>
-              </a:ext>
-            </a:extLst>
-          </p:cNvPr>
-          <p:cNvPicPr>
-            <a:picLocks noGrp="1" noChangeAspect="1"/>
-          </p:cNvPicPr>
-          <p:nvPr>
-            <p:ph type="pic" sz="quarter" idx="16"/>
-          </p:nvPr>
-        </p:nvPicPr>
-        <p:blipFill>
-          <a:blip r:embed="rId7">
-            <a:extLst>
-              <a:ext uri="{28A0092B-C50C-407E-A947-70E740481C1C}">
-                <a14:useLocalDpi xmlns:a14="http://schemas.microsoft.com/office/drawing/2010/main" val="0"/>
-              </a:ext>
-            </a:extLst>
-          </a:blip>
-          <a:srcRect l="2865" r="2865"/>
-          <a:stretch>
-            <a:fillRect/>
-          </a:stretch>
-        </p:blipFill>
-        <p:spPr/>
-      </p:pic>
-      <p:pic>
-        <p:nvPicPr>
-          <p:cNvPr id="50" name="Picture Placeholder 49" descr="Chart, line chart&#10;&#10;Description automatically generated">
-            <a:extLst>
-              <a:ext uri="{FF2B5EF4-FFF2-40B4-BE49-F238E27FC236}">
-                <a16:creationId xmlns:a16="http://schemas.microsoft.com/office/drawing/2014/main" id="{CA49552F-8649-4BB0-9D55-2977759EB12B}"/>
-              </a:ext>
-            </a:extLst>
-          </p:cNvPr>
-          <p:cNvPicPr>
-            <a:picLocks noGrp="1" noChangeAspect="1"/>
-          </p:cNvPicPr>
-          <p:nvPr>
-            <p:ph type="pic" sz="quarter" idx="17"/>
-          </p:nvPr>
-        </p:nvPicPr>
-        <p:blipFill>
-          <a:blip r:embed="rId8">
-            <a:extLst>
-              <a:ext uri="{28A0092B-C50C-407E-A947-70E740481C1C}">
-                <a14:useLocalDpi xmlns:a14="http://schemas.microsoft.com/office/drawing/2010/main" val="0"/>
-              </a:ext>
-            </a:extLst>
-          </a:blip>
-          <a:srcRect l="2865" r="2865"/>
-          <a:stretch>
-            <a:fillRect/>
-          </a:stretch>
-        </p:blipFill>
-        <p:spPr/>
-      </p:pic>
-    </p:spTree>
-    <p:extLst>
-      <p:ext uri="{BB962C8B-B14F-4D97-AF65-F5344CB8AC3E}">
-        <p14:creationId xmlns:p14="http://schemas.microsoft.com/office/powerpoint/2010/main" val="2726566704"/>
       </p:ext>
     </p:extLst>
   </p:cSld>
@@ -10364,7 +10753,7 @@
         <p:spPr>
           <a:xfrm>
             <a:off x="425454" y="1296001"/>
-            <a:ext cx="11345332" cy="609780"/>
+            <a:ext cx="11345332" cy="1062342"/>
           </a:xfrm>
         </p:spPr>
         <p:txBody>
@@ -10373,7 +10762,7 @@
           <a:p>
             <a:r>
               <a:rPr lang="de-DE"/>
-              <a:t>Auswertung - Simulationsergebnisse</a:t>
+              <a:t>Auswertung - Sulationsergebnisse</a:t>
             </a:r>
             <a:r>
               <a:rPr lang="en-DE"/>
@@ -10383,7 +10772,7 @@
               <a:rPr lang="en-DE">
                 <a:sym typeface="Symbol" panose="05050102010706020507" pitchFamily="18" charset="2"/>
               </a:rPr>
-              <a:t> = 3.5</a:t>
+              <a:t> = 2.0</a:t>
             </a:r>
             <a:br>
               <a:rPr lang="en-DE">
@@ -10426,10 +10815,10 @@
       </p:sp>
       <p:pic>
         <p:nvPicPr>
-          <p:cNvPr id="18" name="Picture Placeholder 17" descr="Chart&#10;&#10;Description automatically generated">
+          <p:cNvPr id="6" name="Bildplatzhalter 5">
             <a:extLst>
               <a:ext uri="{FF2B5EF4-FFF2-40B4-BE49-F238E27FC236}">
-                <a16:creationId xmlns:a16="http://schemas.microsoft.com/office/drawing/2014/main" id="{10BE79B8-0B97-4964-9811-DA92A3D85349}"/>
+                <a16:creationId xmlns:a16="http://schemas.microsoft.com/office/drawing/2014/main" id="{BC2FB6CF-C943-45DC-BCF9-E5F9E82298F1}"/>
               </a:ext>
             </a:extLst>
           </p:cNvPr>
@@ -10437,7 +10826,7 @@
             <a:picLocks noGrp="1" noChangeAspect="1"/>
           </p:cNvPicPr>
           <p:nvPr>
-            <p:ph type="pic" sz="quarter" idx="12"/>
+            <p:ph type="pic" sz="quarter" idx="13"/>
           </p:nvPr>
         </p:nvPicPr>
         <p:blipFill>
@@ -10448,7 +10837,7 @@
               </a:ext>
             </a:extLst>
           </a:blip>
-          <a:srcRect l="2896" r="2896"/>
+          <a:srcRect l="2914" r="2914"/>
           <a:stretch>
             <a:fillRect/>
           </a:stretch>
@@ -10457,10 +10846,10 @@
       </p:pic>
       <p:pic>
         <p:nvPicPr>
-          <p:cNvPr id="14" name="Picture Placeholder 13" descr="Chart, line chart&#10;&#10;Description automatically generated">
+          <p:cNvPr id="14" name="Bildplatzhalter 13">
             <a:extLst>
               <a:ext uri="{FF2B5EF4-FFF2-40B4-BE49-F238E27FC236}">
-                <a16:creationId xmlns:a16="http://schemas.microsoft.com/office/drawing/2014/main" id="{8909F49F-BE98-457E-B955-D69150C8358F}"/>
+                <a16:creationId xmlns:a16="http://schemas.microsoft.com/office/drawing/2014/main" id="{39ADBB1F-F647-4840-A819-6201C4C079A3}"/>
               </a:ext>
             </a:extLst>
           </p:cNvPr>
@@ -10468,7 +10857,7 @@
             <a:picLocks noGrp="1" noChangeAspect="1"/>
           </p:cNvPicPr>
           <p:nvPr>
-            <p:ph type="pic" sz="quarter" idx="13"/>
+            <p:ph type="pic" sz="quarter" idx="15"/>
           </p:nvPr>
         </p:nvPicPr>
         <p:blipFill>
@@ -10479,7 +10868,7 @@
               </a:ext>
             </a:extLst>
           </a:blip>
-          <a:srcRect l="2896" r="2896"/>
+          <a:srcRect l="2890" r="2890"/>
           <a:stretch>
             <a:fillRect/>
           </a:stretch>
@@ -10488,10 +10877,10 @@
       </p:pic>
       <p:pic>
         <p:nvPicPr>
-          <p:cNvPr id="23" name="Picture Placeholder 22">
+          <p:cNvPr id="19" name="Bildplatzhalter 18">
             <a:extLst>
               <a:ext uri="{FF2B5EF4-FFF2-40B4-BE49-F238E27FC236}">
-                <a16:creationId xmlns:a16="http://schemas.microsoft.com/office/drawing/2014/main" id="{7CA9995D-FA24-48C1-B501-CCADCC747882}"/>
+                <a16:creationId xmlns:a16="http://schemas.microsoft.com/office/drawing/2014/main" id="{81BD2B46-D649-4A88-89B2-63F2ED5AB583}"/>
               </a:ext>
             </a:extLst>
           </p:cNvPr>
@@ -10499,7 +10888,7 @@
             <a:picLocks noGrp="1" noChangeAspect="1"/>
           </p:cNvPicPr>
           <p:nvPr>
-            <p:ph type="pic" sz="quarter" idx="14"/>
+            <p:ph type="pic" sz="quarter" idx="17"/>
           </p:nvPr>
         </p:nvPicPr>
         <p:blipFill>
@@ -10510,7 +10899,7 @@
               </a:ext>
             </a:extLst>
           </a:blip>
-          <a:srcRect l="2872" r="2872"/>
+          <a:srcRect l="2883" r="2883"/>
           <a:stretch>
             <a:fillRect/>
           </a:stretch>
@@ -10519,10 +10908,10 @@
       </p:pic>
       <p:pic>
         <p:nvPicPr>
-          <p:cNvPr id="21" name="Picture Placeholder 20">
+          <p:cNvPr id="21" name="Bildplatzhalter 20">
             <a:extLst>
               <a:ext uri="{FF2B5EF4-FFF2-40B4-BE49-F238E27FC236}">
-                <a16:creationId xmlns:a16="http://schemas.microsoft.com/office/drawing/2014/main" id="{1A656136-5538-4D91-94B4-935E56542102}"/>
+                <a16:creationId xmlns:a16="http://schemas.microsoft.com/office/drawing/2014/main" id="{6920A2F9-1B20-40E3-9641-2DB9BC216FB4}"/>
               </a:ext>
             </a:extLst>
           </p:cNvPr>
@@ -10530,7 +10919,7 @@
             <a:picLocks noGrp="1" noChangeAspect="1"/>
           </p:cNvPicPr>
           <p:nvPr>
-            <p:ph type="pic" sz="quarter" idx="15"/>
+            <p:ph type="pic" sz="quarter" idx="16"/>
           </p:nvPr>
         </p:nvPicPr>
         <p:blipFill>
@@ -10541,7 +10930,7 @@
               </a:ext>
             </a:extLst>
           </a:blip>
-          <a:srcRect l="2872" r="2872"/>
+          <a:srcRect l="2883" r="2883"/>
           <a:stretch>
             <a:fillRect/>
           </a:stretch>
@@ -10550,10 +10939,10 @@
       </p:pic>
       <p:pic>
         <p:nvPicPr>
-          <p:cNvPr id="27" name="Picture Placeholder 26">
+          <p:cNvPr id="17" name="Bildplatzhalter 16">
             <a:extLst>
               <a:ext uri="{FF2B5EF4-FFF2-40B4-BE49-F238E27FC236}">
-                <a16:creationId xmlns:a16="http://schemas.microsoft.com/office/drawing/2014/main" id="{05AFBEA3-363F-458C-AAB7-927ABE103A06}"/>
+                <a16:creationId xmlns:a16="http://schemas.microsoft.com/office/drawing/2014/main" id="{A082A0F2-5509-47A2-9F1E-B5E64F3B9A4E}"/>
               </a:ext>
             </a:extLst>
           </p:cNvPr>
@@ -10561,7 +10950,7 @@
             <a:picLocks noGrp="1" noChangeAspect="1"/>
           </p:cNvPicPr>
           <p:nvPr>
-            <p:ph type="pic" sz="quarter" idx="16"/>
+            <p:ph type="pic" sz="quarter" idx="14"/>
           </p:nvPr>
         </p:nvPicPr>
         <p:blipFill>
@@ -10572,7 +10961,7 @@
               </a:ext>
             </a:extLst>
           </a:blip>
-          <a:srcRect l="2865" r="2865"/>
+          <a:srcRect l="2890" r="2890"/>
           <a:stretch>
             <a:fillRect/>
           </a:stretch>
@@ -10581,10 +10970,10 @@
       </p:pic>
       <p:pic>
         <p:nvPicPr>
-          <p:cNvPr id="25" name="Picture Placeholder 24">
+          <p:cNvPr id="10" name="Bildplatzhalter 9">
             <a:extLst>
               <a:ext uri="{FF2B5EF4-FFF2-40B4-BE49-F238E27FC236}">
-                <a16:creationId xmlns:a16="http://schemas.microsoft.com/office/drawing/2014/main" id="{E9B80E43-F9C8-4BCD-82D7-4F78C2E8E953}"/>
+                <a16:creationId xmlns:a16="http://schemas.microsoft.com/office/drawing/2014/main" id="{4C0A121E-8C2E-417E-8A84-50F4C07666D7}"/>
               </a:ext>
             </a:extLst>
           </p:cNvPr>
@@ -10592,7 +10981,7 @@
             <a:picLocks noGrp="1" noChangeAspect="1"/>
           </p:cNvPicPr>
           <p:nvPr>
-            <p:ph type="pic" sz="quarter" idx="17"/>
+            <p:ph type="pic" sz="quarter" idx="12"/>
           </p:nvPr>
         </p:nvPicPr>
         <p:blipFill>
@@ -10603,7 +10992,7 @@
               </a:ext>
             </a:extLst>
           </a:blip>
-          <a:srcRect l="2865" r="2865"/>
+          <a:srcRect l="2914" r="2914"/>
           <a:stretch>
             <a:fillRect/>
           </a:stretch>
@@ -10613,7 +11002,7 @@
     </p:spTree>
     <p:extLst>
       <p:ext uri="{BB962C8B-B14F-4D97-AF65-F5344CB8AC3E}">
-        <p14:creationId xmlns:p14="http://schemas.microsoft.com/office/powerpoint/2010/main" val="3784441138"/>
+        <p14:creationId xmlns:p14="http://schemas.microsoft.com/office/powerpoint/2010/main" val="2726566704"/>
       </p:ext>
     </p:extLst>
   </p:cSld>
@@ -10659,7 +11048,7 @@
         <p:spPr>
           <a:xfrm>
             <a:off x="425454" y="1296001"/>
-            <a:ext cx="11345332" cy="590219"/>
+            <a:ext cx="11345332" cy="609780"/>
           </a:xfrm>
         </p:spPr>
         <p:txBody>
@@ -10678,7 +11067,7 @@
               <a:rPr lang="en-DE">
                 <a:sym typeface="Symbol" panose="05050102010706020507" pitchFamily="18" charset="2"/>
               </a:rPr>
-              <a:t> = 5.0</a:t>
+              <a:t> = 3.5</a:t>
             </a:r>
             <a:br>
               <a:rPr lang="en-DE">
@@ -10721,10 +11110,10 @@
       </p:sp>
       <p:pic>
         <p:nvPicPr>
-          <p:cNvPr id="18" name="Picture Placeholder 17">
+          <p:cNvPr id="6" name="Bildplatzhalter 5">
             <a:extLst>
               <a:ext uri="{FF2B5EF4-FFF2-40B4-BE49-F238E27FC236}">
-                <a16:creationId xmlns:a16="http://schemas.microsoft.com/office/drawing/2014/main" id="{31A1CF6E-5813-4848-B86B-D1A4D9A03203}"/>
+                <a16:creationId xmlns:a16="http://schemas.microsoft.com/office/drawing/2014/main" id="{DB5963CB-AE8A-435E-90FA-D6A0DD1DA351}"/>
               </a:ext>
             </a:extLst>
           </p:cNvPr>
@@ -10732,7 +11121,7 @@
             <a:picLocks noGrp="1" noChangeAspect="1"/>
           </p:cNvPicPr>
           <p:nvPr>
-            <p:ph type="pic" sz="quarter" idx="12"/>
+            <p:ph type="pic" sz="quarter" idx="13"/>
           </p:nvPr>
         </p:nvPicPr>
         <p:blipFill>
@@ -10743,7 +11132,7 @@
               </a:ext>
             </a:extLst>
           </a:blip>
-          <a:srcRect l="2896" r="2896"/>
+          <a:srcRect l="2914" r="2914"/>
           <a:stretch>
             <a:fillRect/>
           </a:stretch>
@@ -10752,10 +11141,10 @@
       </p:pic>
       <p:pic>
         <p:nvPicPr>
-          <p:cNvPr id="14" name="Picture Placeholder 13">
+          <p:cNvPr id="10" name="Bildplatzhalter 9">
             <a:extLst>
               <a:ext uri="{FF2B5EF4-FFF2-40B4-BE49-F238E27FC236}">
-                <a16:creationId xmlns:a16="http://schemas.microsoft.com/office/drawing/2014/main" id="{65122484-C62D-4D85-9A31-129B4BD6A4B4}"/>
+                <a16:creationId xmlns:a16="http://schemas.microsoft.com/office/drawing/2014/main" id="{181370E3-4A00-4A57-A473-714204E25E3F}"/>
               </a:ext>
             </a:extLst>
           </p:cNvPr>
@@ -10763,7 +11152,7 @@
             <a:picLocks noGrp="1" noChangeAspect="1"/>
           </p:cNvPicPr>
           <p:nvPr>
-            <p:ph type="pic" sz="quarter" idx="13"/>
+            <p:ph type="pic" sz="quarter" idx="12"/>
           </p:nvPr>
         </p:nvPicPr>
         <p:blipFill>
@@ -10774,7 +11163,7 @@
               </a:ext>
             </a:extLst>
           </a:blip>
-          <a:srcRect l="2896" r="2896"/>
+          <a:srcRect l="2914" r="2914"/>
           <a:stretch>
             <a:fillRect/>
           </a:stretch>
@@ -10783,10 +11172,10 @@
       </p:pic>
       <p:pic>
         <p:nvPicPr>
-          <p:cNvPr id="23" name="Picture Placeholder 22">
+          <p:cNvPr id="14" name="Bildplatzhalter 13">
             <a:extLst>
               <a:ext uri="{FF2B5EF4-FFF2-40B4-BE49-F238E27FC236}">
-                <a16:creationId xmlns:a16="http://schemas.microsoft.com/office/drawing/2014/main" id="{47A4D870-17FF-41D7-814E-999548CF48AE}"/>
+                <a16:creationId xmlns:a16="http://schemas.microsoft.com/office/drawing/2014/main" id="{799C7FE1-4B7D-4CEA-B889-E3A9FAF0F543}"/>
               </a:ext>
             </a:extLst>
           </p:cNvPr>
@@ -10794,7 +11183,7 @@
             <a:picLocks noGrp="1" noChangeAspect="1"/>
           </p:cNvPicPr>
           <p:nvPr>
-            <p:ph type="pic" sz="quarter" idx="14"/>
+            <p:ph type="pic" sz="quarter" idx="15"/>
           </p:nvPr>
         </p:nvPicPr>
         <p:blipFill>
@@ -10805,7 +11194,7 @@
               </a:ext>
             </a:extLst>
           </a:blip>
-          <a:srcRect l="2872" r="2872"/>
+          <a:srcRect l="2890" r="2890"/>
           <a:stretch>
             <a:fillRect/>
           </a:stretch>
@@ -10814,10 +11203,10 @@
       </p:pic>
       <p:pic>
         <p:nvPicPr>
-          <p:cNvPr id="21" name="Picture Placeholder 20">
+          <p:cNvPr id="17" name="Bildplatzhalter 16">
             <a:extLst>
               <a:ext uri="{FF2B5EF4-FFF2-40B4-BE49-F238E27FC236}">
-                <a16:creationId xmlns:a16="http://schemas.microsoft.com/office/drawing/2014/main" id="{CD56E517-91D5-4BC7-B116-E278F7574C06}"/>
+                <a16:creationId xmlns:a16="http://schemas.microsoft.com/office/drawing/2014/main" id="{41A24465-2E6F-4F04-AA77-9344E574DB8D}"/>
               </a:ext>
             </a:extLst>
           </p:cNvPr>
@@ -10825,7 +11214,7 @@
             <a:picLocks noGrp="1" noChangeAspect="1"/>
           </p:cNvPicPr>
           <p:nvPr>
-            <p:ph type="pic" sz="quarter" idx="15"/>
+            <p:ph type="pic" sz="quarter" idx="14"/>
           </p:nvPr>
         </p:nvPicPr>
         <p:blipFill>
@@ -10836,7 +11225,7 @@
               </a:ext>
             </a:extLst>
           </a:blip>
-          <a:srcRect l="2872" r="2872"/>
+          <a:srcRect l="2890" r="2890"/>
           <a:stretch>
             <a:fillRect/>
           </a:stretch>
@@ -10845,10 +11234,10 @@
       </p:pic>
       <p:pic>
         <p:nvPicPr>
-          <p:cNvPr id="27" name="Picture Placeholder 26">
+          <p:cNvPr id="21" name="Bildplatzhalter 20">
             <a:extLst>
               <a:ext uri="{FF2B5EF4-FFF2-40B4-BE49-F238E27FC236}">
-                <a16:creationId xmlns:a16="http://schemas.microsoft.com/office/drawing/2014/main" id="{5FD0DF30-6E78-4F34-8996-1E2501D82A06}"/>
+                <a16:creationId xmlns:a16="http://schemas.microsoft.com/office/drawing/2014/main" id="{C30906DD-E25F-4CE9-B7BA-D54CF6301F87}"/>
               </a:ext>
             </a:extLst>
           </p:cNvPr>
@@ -10867,7 +11256,7 @@
               </a:ext>
             </a:extLst>
           </a:blip>
-          <a:srcRect l="2865" r="2865"/>
+          <a:srcRect l="2883" r="2883"/>
           <a:stretch>
             <a:fillRect/>
           </a:stretch>
@@ -10876,10 +11265,10 @@
       </p:pic>
       <p:pic>
         <p:nvPicPr>
-          <p:cNvPr id="25" name="Picture Placeholder 24">
+          <p:cNvPr id="19" name="Bildplatzhalter 18">
             <a:extLst>
               <a:ext uri="{FF2B5EF4-FFF2-40B4-BE49-F238E27FC236}">
-                <a16:creationId xmlns:a16="http://schemas.microsoft.com/office/drawing/2014/main" id="{E99C5BD1-7769-4B63-86C7-B45CF29429AC}"/>
+                <a16:creationId xmlns:a16="http://schemas.microsoft.com/office/drawing/2014/main" id="{05E24533-00E9-4D26-92CD-B50A986ED177}"/>
               </a:ext>
             </a:extLst>
           </p:cNvPr>
@@ -10898,7 +11287,7 @@
               </a:ext>
             </a:extLst>
           </a:blip>
-          <a:srcRect l="2865" r="2865"/>
+          <a:srcRect l="2883" r="2883"/>
           <a:stretch>
             <a:fillRect/>
           </a:stretch>
@@ -10908,7 +11297,7 @@
     </p:spTree>
     <p:extLst>
       <p:ext uri="{BB962C8B-B14F-4D97-AF65-F5344CB8AC3E}">
-        <p14:creationId xmlns:p14="http://schemas.microsoft.com/office/powerpoint/2010/main" val="3420026770"/>
+        <p14:creationId xmlns:p14="http://schemas.microsoft.com/office/powerpoint/2010/main" val="3784441138"/>
       </p:ext>
     </p:extLst>
   </p:cSld>
@@ -10935,12 +11324,91 @@
           <a:chExt cx="0" cy="0"/>
         </a:xfrm>
       </p:grpSpPr>
+      <p:sp>
+        <p:nvSpPr>
+          <p:cNvPr id="4" name="Title 3">
+            <a:extLst>
+              <a:ext uri="{FF2B5EF4-FFF2-40B4-BE49-F238E27FC236}">
+                <a16:creationId xmlns:a16="http://schemas.microsoft.com/office/drawing/2014/main" id="{ED5AAF87-5132-49A2-BA4B-F60CA9B9AE29}"/>
+              </a:ext>
+            </a:extLst>
+          </p:cNvPr>
+          <p:cNvSpPr>
+            <a:spLocks noGrp="1"/>
+          </p:cNvSpPr>
+          <p:nvPr>
+            <p:ph type="title"/>
+          </p:nvPr>
+        </p:nvSpPr>
+        <p:spPr>
+          <a:xfrm>
+            <a:off x="425454" y="1296001"/>
+            <a:ext cx="11345332" cy="590219"/>
+          </a:xfrm>
+        </p:spPr>
+        <p:txBody>
+          <a:bodyPr/>
+          <a:lstStyle/>
+          <a:p>
+            <a:r>
+              <a:rPr lang="de-DE"/>
+              <a:t>Auswertung - Simulationsergebnisse</a:t>
+            </a:r>
+            <a:r>
+              <a:rPr lang="en-DE"/>
+              <a:t> für </a:t>
+            </a:r>
+            <a:r>
+              <a:rPr lang="en-DE">
+                <a:sym typeface="Symbol" panose="05050102010706020507" pitchFamily="18" charset="2"/>
+              </a:rPr>
+              <a:t> = 5.0</a:t>
+            </a:r>
+            <a:br>
+              <a:rPr lang="en-DE">
+                <a:sym typeface="Symbol" panose="05050102010706020507" pitchFamily="18" charset="2"/>
+              </a:rPr>
+            </a:br>
+            <a:endParaRPr lang="de-DE"/>
+          </a:p>
+        </p:txBody>
+      </p:sp>
+      <p:sp>
+        <p:nvSpPr>
+          <p:cNvPr id="5" name="Slide Number Placeholder 4">
+            <a:extLst>
+              <a:ext uri="{FF2B5EF4-FFF2-40B4-BE49-F238E27FC236}">
+                <a16:creationId xmlns:a16="http://schemas.microsoft.com/office/drawing/2014/main" id="{FE4D06CA-9DA8-44D5-B15F-AAA999F7CDFA}"/>
+              </a:ext>
+            </a:extLst>
+          </p:cNvPr>
+          <p:cNvSpPr>
+            <a:spLocks noGrp="1"/>
+          </p:cNvSpPr>
+          <p:nvPr>
+            <p:ph type="sldNum" sz="quarter" idx="11"/>
+          </p:nvPr>
+        </p:nvSpPr>
+        <p:spPr/>
+        <p:txBody>
+          <a:bodyPr/>
+          <a:lstStyle/>
+          <a:p>
+            <a:fld id="{CE58CB1E-F828-4F11-99E0-327109AF9DA4}" type="slidenum">
+              <a:rPr lang="de-DE" smtClean="0"/>
+              <a:pPr/>
+              <a:t>9</a:t>
+            </a:fld>
+            <a:endParaRPr lang="de-DE"/>
+          </a:p>
+        </p:txBody>
+      </p:sp>
       <p:pic>
         <p:nvPicPr>
-          <p:cNvPr id="13" name="Content Placeholder 12">
+          <p:cNvPr id="6" name="Bildplatzhalter 5">
             <a:extLst>
               <a:ext uri="{FF2B5EF4-FFF2-40B4-BE49-F238E27FC236}">
-                <a16:creationId xmlns:a16="http://schemas.microsoft.com/office/drawing/2014/main" id="{CD758305-EF36-4FF5-82EC-8A6DBBF5DE29}"/>
+                <a16:creationId xmlns:a16="http://schemas.microsoft.com/office/drawing/2014/main" id="{B503551A-B5B7-482A-939C-7B96A15128A5}"/>
               </a:ext>
             </a:extLst>
           </p:cNvPr>
@@ -10948,112 +11416,8 @@
             <a:picLocks noGrp="1" noChangeAspect="1"/>
           </p:cNvPicPr>
           <p:nvPr>
-            <p:ph idx="1"/>
-          </p:nvPr>
-        </p:nvPicPr>
-        <p:blipFill>
-          <a:blip r:embed="rId2">
-            <a:extLst>
-              <a:ext uri="{28A0092B-C50C-407E-A947-70E740481C1C}">
-                <a14:useLocalDpi xmlns:a14="http://schemas.microsoft.com/office/drawing/2010/main" val="0"/>
-              </a:ext>
-            </a:extLst>
-          </a:blip>
-          <a:stretch>
-            <a:fillRect/>
-          </a:stretch>
-        </p:blipFill>
-        <p:spPr>
-          <a:xfrm>
-            <a:off x="2562738" y="2322872"/>
-            <a:ext cx="6781288" cy="1081532"/>
-          </a:xfrm>
-        </p:spPr>
-      </p:pic>
-      <p:sp>
-        <p:nvSpPr>
-          <p:cNvPr id="10" name="Title 9">
-            <a:extLst>
-              <a:ext uri="{FF2B5EF4-FFF2-40B4-BE49-F238E27FC236}">
-                <a16:creationId xmlns:a16="http://schemas.microsoft.com/office/drawing/2014/main" id="{045FF1FA-A520-42DC-8543-626093AB4C4F}"/>
-              </a:ext>
-            </a:extLst>
-          </p:cNvPr>
-          <p:cNvSpPr>
-            <a:spLocks noGrp="1"/>
-          </p:cNvSpPr>
-          <p:nvPr>
-            <p:ph type="title"/>
-          </p:nvPr>
-        </p:nvSpPr>
-        <p:spPr/>
-        <p:txBody>
-          <a:bodyPr/>
-          <a:lstStyle/>
-          <a:p>
-            <a:r>
-              <a:rPr lang="de-DE"/>
-              <a:t>Auswertung – W</a:t>
-            </a:r>
-            <a:r>
-              <a:rPr lang="en-DE" err="1"/>
-              <a:t>ichtigste</a:t>
-            </a:r>
-            <a:r>
-              <a:rPr lang="en-DE"/>
-              <a:t> </a:t>
-            </a:r>
-            <a:r>
-              <a:rPr lang="en-DE" err="1"/>
-              <a:t>Resultate</a:t>
-            </a:r>
-            <a:endParaRPr lang="de-DE"/>
-          </a:p>
-        </p:txBody>
-      </p:sp>
-      <p:sp>
-        <p:nvSpPr>
-          <p:cNvPr id="3" name="Slide Number Placeholder 2">
-            <a:extLst>
-              <a:ext uri="{FF2B5EF4-FFF2-40B4-BE49-F238E27FC236}">
-                <a16:creationId xmlns:a16="http://schemas.microsoft.com/office/drawing/2014/main" id="{A7B8FAC6-34C2-4AE0-A37F-651E9D939C1B}"/>
-              </a:ext>
-            </a:extLst>
-          </p:cNvPr>
-          <p:cNvSpPr>
-            <a:spLocks noGrp="1"/>
-          </p:cNvSpPr>
-          <p:nvPr>
-            <p:ph type="sldNum" sz="quarter" idx="11"/>
-          </p:nvPr>
-        </p:nvSpPr>
-        <p:spPr/>
-        <p:txBody>
-          <a:bodyPr/>
-          <a:lstStyle/>
-          <a:p>
-            <a:fld id="{CE58CB1E-F828-4F11-99E0-327109AF9DA4}" type="slidenum">
-              <a:rPr lang="de-DE" smtClean="0"/>
-              <a:pPr/>
-              <a:t>9</a:t>
-            </a:fld>
-            <a:endParaRPr lang="de-DE"/>
-          </a:p>
-        </p:txBody>
-      </p:sp>
-      <p:pic>
-        <p:nvPicPr>
-          <p:cNvPr id="15" name="Picture 14" descr="Table&#10;&#10;Description automatically generated">
-            <a:extLst>
-              <a:ext uri="{FF2B5EF4-FFF2-40B4-BE49-F238E27FC236}">
-                <a16:creationId xmlns:a16="http://schemas.microsoft.com/office/drawing/2014/main" id="{8F38A597-46E4-43B5-AFA5-18415A460EF2}"/>
-              </a:ext>
-            </a:extLst>
-          </p:cNvPr>
-          <p:cNvPicPr>
-            <a:picLocks noChangeAspect="1"/>
-          </p:cNvPicPr>
-          <p:nvPr/>
+            <p:ph type="pic" sz="quarter" idx="13"/>
+          </p:nvPr>
         </p:nvPicPr>
         <p:blipFill>
           <a:blip r:embed="rId3">
@@ -11063,33 +11427,28 @@
               </a:ext>
             </a:extLst>
           </a:blip>
+          <a:srcRect l="2914" r="2914"/>
           <a:stretch>
             <a:fillRect/>
           </a:stretch>
         </p:blipFill>
-        <p:spPr>
-          <a:xfrm>
-            <a:off x="2562738" y="3600878"/>
-            <a:ext cx="6771682" cy="1080000"/>
-          </a:xfrm>
-          <a:prstGeom prst="rect">
-            <a:avLst/>
-          </a:prstGeom>
-        </p:spPr>
+        <p:spPr/>
       </p:pic>
       <p:pic>
         <p:nvPicPr>
-          <p:cNvPr id="17" name="Picture 16" descr="Table&#10;&#10;Description automatically generated">
+          <p:cNvPr id="14" name="Bildplatzhalter 13">
             <a:extLst>
               <a:ext uri="{FF2B5EF4-FFF2-40B4-BE49-F238E27FC236}">
-                <a16:creationId xmlns:a16="http://schemas.microsoft.com/office/drawing/2014/main" id="{69391803-E063-43CD-ABD5-2057F005CD5C}"/>
+                <a16:creationId xmlns:a16="http://schemas.microsoft.com/office/drawing/2014/main" id="{A5EAEF05-B2A5-403B-82AE-B6E6F5914F13}"/>
               </a:ext>
             </a:extLst>
           </p:cNvPr>
           <p:cNvPicPr>
-            <a:picLocks noChangeAspect="1"/>
+            <a:picLocks noGrp="1" noChangeAspect="1"/>
           </p:cNvPicPr>
-          <p:nvPr/>
+          <p:nvPr>
+            <p:ph type="pic" sz="quarter" idx="15"/>
+          </p:nvPr>
         </p:nvPicPr>
         <p:blipFill>
           <a:blip r:embed="rId4">
@@ -11099,24 +11458,141 @@
               </a:ext>
             </a:extLst>
           </a:blip>
+          <a:srcRect l="2890" r="2890"/>
           <a:stretch>
             <a:fillRect/>
           </a:stretch>
         </p:blipFill>
-        <p:spPr>
-          <a:xfrm>
-            <a:off x="2562738" y="4877352"/>
-            <a:ext cx="6771682" cy="1080000"/>
-          </a:xfrm>
-          <a:prstGeom prst="rect">
-            <a:avLst/>
-          </a:prstGeom>
-        </p:spPr>
+        <p:spPr/>
+      </p:pic>
+      <p:pic>
+        <p:nvPicPr>
+          <p:cNvPr id="19" name="Bildplatzhalter 18">
+            <a:extLst>
+              <a:ext uri="{FF2B5EF4-FFF2-40B4-BE49-F238E27FC236}">
+                <a16:creationId xmlns:a16="http://schemas.microsoft.com/office/drawing/2014/main" id="{5A81EA32-14FA-413B-8F4B-44FF8997B471}"/>
+              </a:ext>
+            </a:extLst>
+          </p:cNvPr>
+          <p:cNvPicPr>
+            <a:picLocks noGrp="1" noChangeAspect="1"/>
+          </p:cNvPicPr>
+          <p:nvPr>
+            <p:ph type="pic" sz="quarter" idx="17"/>
+          </p:nvPr>
+        </p:nvPicPr>
+        <p:blipFill>
+          <a:blip r:embed="rId5">
+            <a:extLst>
+              <a:ext uri="{28A0092B-C50C-407E-A947-70E740481C1C}">
+                <a14:useLocalDpi xmlns:a14="http://schemas.microsoft.com/office/drawing/2010/main" val="0"/>
+              </a:ext>
+            </a:extLst>
+          </a:blip>
+          <a:srcRect l="2883" r="2883"/>
+          <a:stretch>
+            <a:fillRect/>
+          </a:stretch>
+        </p:blipFill>
+        <p:spPr/>
+      </p:pic>
+      <p:pic>
+        <p:nvPicPr>
+          <p:cNvPr id="21" name="Bildplatzhalter 20">
+            <a:extLst>
+              <a:ext uri="{FF2B5EF4-FFF2-40B4-BE49-F238E27FC236}">
+                <a16:creationId xmlns:a16="http://schemas.microsoft.com/office/drawing/2014/main" id="{4410B88F-DCA7-4656-9EC9-4EB46F6DB995}"/>
+              </a:ext>
+            </a:extLst>
+          </p:cNvPr>
+          <p:cNvPicPr>
+            <a:picLocks noGrp="1" noChangeAspect="1"/>
+          </p:cNvPicPr>
+          <p:nvPr>
+            <p:ph type="pic" sz="quarter" idx="16"/>
+          </p:nvPr>
+        </p:nvPicPr>
+        <p:blipFill>
+          <a:blip r:embed="rId6">
+            <a:extLst>
+              <a:ext uri="{28A0092B-C50C-407E-A947-70E740481C1C}">
+                <a14:useLocalDpi xmlns:a14="http://schemas.microsoft.com/office/drawing/2010/main" val="0"/>
+              </a:ext>
+            </a:extLst>
+          </a:blip>
+          <a:srcRect l="2883" r="2883"/>
+          <a:stretch>
+            <a:fillRect/>
+          </a:stretch>
+        </p:blipFill>
+        <p:spPr/>
+      </p:pic>
+      <p:pic>
+        <p:nvPicPr>
+          <p:cNvPr id="10" name="Bildplatzhalter 9">
+            <a:extLst>
+              <a:ext uri="{FF2B5EF4-FFF2-40B4-BE49-F238E27FC236}">
+                <a16:creationId xmlns:a16="http://schemas.microsoft.com/office/drawing/2014/main" id="{67392B8B-73EF-4EF1-8660-1425FD87E24E}"/>
+              </a:ext>
+            </a:extLst>
+          </p:cNvPr>
+          <p:cNvPicPr>
+            <a:picLocks noGrp="1" noChangeAspect="1"/>
+          </p:cNvPicPr>
+          <p:nvPr>
+            <p:ph type="pic" sz="quarter" idx="12"/>
+          </p:nvPr>
+        </p:nvPicPr>
+        <p:blipFill>
+          <a:blip r:embed="rId7">
+            <a:extLst>
+              <a:ext uri="{28A0092B-C50C-407E-A947-70E740481C1C}">
+                <a14:useLocalDpi xmlns:a14="http://schemas.microsoft.com/office/drawing/2010/main" val="0"/>
+              </a:ext>
+            </a:extLst>
+          </a:blip>
+          <a:srcRect l="2914" r="2914"/>
+          <a:stretch>
+            <a:fillRect/>
+          </a:stretch>
+        </p:blipFill>
+        <p:spPr/>
+      </p:pic>
+      <p:pic>
+        <p:nvPicPr>
+          <p:cNvPr id="17" name="Bildplatzhalter 16">
+            <a:extLst>
+              <a:ext uri="{FF2B5EF4-FFF2-40B4-BE49-F238E27FC236}">
+                <a16:creationId xmlns:a16="http://schemas.microsoft.com/office/drawing/2014/main" id="{6D63B25F-987C-4B84-A4D2-D80C68392FEF}"/>
+              </a:ext>
+            </a:extLst>
+          </p:cNvPr>
+          <p:cNvPicPr>
+            <a:picLocks noGrp="1" noChangeAspect="1"/>
+          </p:cNvPicPr>
+          <p:nvPr>
+            <p:ph type="pic" sz="quarter" idx="14"/>
+          </p:nvPr>
+        </p:nvPicPr>
+        <p:blipFill>
+          <a:blip r:embed="rId8">
+            <a:extLst>
+              <a:ext uri="{28A0092B-C50C-407E-A947-70E740481C1C}">
+                <a14:useLocalDpi xmlns:a14="http://schemas.microsoft.com/office/drawing/2010/main" val="0"/>
+              </a:ext>
+            </a:extLst>
+          </a:blip>
+          <a:srcRect l="2890" r="2890"/>
+          <a:stretch>
+            <a:fillRect/>
+          </a:stretch>
+        </p:blipFill>
+        <p:spPr/>
       </p:pic>
     </p:spTree>
     <p:extLst>
       <p:ext uri="{BB962C8B-B14F-4D97-AF65-F5344CB8AC3E}">
-        <p14:creationId xmlns:p14="http://schemas.microsoft.com/office/powerpoint/2010/main" val="1434983959"/>
+        <p14:creationId xmlns:p14="http://schemas.microsoft.com/office/powerpoint/2010/main" val="3420026770"/>
       </p:ext>
     </p:extLst>
   </p:cSld>

</xml_diff>

<commit_message>
More corrections of the report
</commit_message>
<xml_diff>
--- a/Bericht/Abschlusspresentation.pptx
+++ b/Bericht/Abschlusspresentation.pptx
@@ -256,7 +256,7 @@
           <a:p>
             <a:fld id="{390B7238-C8AA-4053-ADDE-FFB5E77BCA46}" type="datetimeFigureOut">
               <a:rPr lang="en-US" smtClean="0"/>
-              <a:t>2/21/2022</a:t>
+              <a:t>2/25/2022</a:t>
             </a:fld>
             <a:endParaRPr lang="en-US"/>
           </a:p>
@@ -8095,7 +8095,7 @@
           <a:p>
             <a:fld id="{24EC9E26-044F-425B-9531-88D848027D37}" type="datetimeFigureOut">
               <a:rPr lang="de-DE" smtClean="0"/>
-              <a:t>21.02.2022</a:t>
+              <a:t>25.02.2022</a:t>
             </a:fld>
             <a:endParaRPr lang="de-DE"/>
           </a:p>
@@ -8692,36 +8692,6 @@
               <a:t> 2022</a:t>
             </a:r>
             <a:endParaRPr lang="de-DE" dirty="0"/>
-          </a:p>
-        </p:txBody>
-      </p:sp>
-      <p:sp>
-        <p:nvSpPr>
-          <p:cNvPr id="7" name="Slide Number Placeholder 6">
-            <a:extLst>
-              <a:ext uri="{FF2B5EF4-FFF2-40B4-BE49-F238E27FC236}">
-                <a16:creationId xmlns:a16="http://schemas.microsoft.com/office/drawing/2014/main" id="{2090D3D3-536E-4F36-8662-480594D507FB}"/>
-              </a:ext>
-            </a:extLst>
-          </p:cNvPr>
-          <p:cNvSpPr>
-            <a:spLocks noGrp="1"/>
-          </p:cNvSpPr>
-          <p:nvPr>
-            <p:ph type="sldNum" sz="quarter" idx="11"/>
-          </p:nvPr>
-        </p:nvSpPr>
-        <p:spPr/>
-        <p:txBody>
-          <a:bodyPr/>
-          <a:lstStyle/>
-          <a:p>
-            <a:fld id="{CE58CB1E-F828-4F11-99E0-327109AF9DA4}" type="slidenum">
-              <a:rPr lang="de-DE" smtClean="0"/>
-              <a:pPr/>
-              <a:t>1</a:t>
-            </a:fld>
-            <a:endParaRPr lang="de-DE"/>
           </a:p>
         </p:txBody>
       </p:sp>
@@ -9109,8 +9079,8 @@
           </a:p>
           <a:p>
             <a:pPr marL="577845" lvl="1" indent="-342900">
-              <a:buFont typeface="Arial" panose="020B0604020202020204" pitchFamily="34" charset="0"/>
-              <a:buChar char="̶"/>
+              <a:buFont typeface="Symbol" panose="05050102010706020507" pitchFamily="18" charset="2"/>
+              <a:buChar char=""/>
             </a:pPr>
             <a:r>
               <a:rPr lang="de-DE" dirty="0"/>
@@ -9138,9 +9108,8 @@
             </a:r>
           </a:p>
           <a:p>
-            <a:pPr marL="577845" lvl="1" indent="-342900">
-              <a:buFont typeface="Arial" panose="020B0604020202020204" pitchFamily="34" charset="0"/>
-              <a:buChar char="̶"/>
+            <a:pPr lvl="1" indent="0">
+              <a:buNone/>
             </a:pPr>
             <a:endParaRPr lang="de-DE" dirty="0"/>
           </a:p>
@@ -9156,8 +9125,8 @@
           </a:p>
           <a:p>
             <a:pPr marL="577845" lvl="1" indent="-342900">
-              <a:buFont typeface="Arial" panose="020B0604020202020204" pitchFamily="34" charset="0"/>
-              <a:buChar char="̶"/>
+              <a:buFont typeface="Symbol" panose="05050102010706020507" pitchFamily="18" charset="2"/>
+              <a:buChar char=""/>
             </a:pPr>
             <a:r>
               <a:rPr lang="de-DE" dirty="0"/>
@@ -9513,199 +9482,353 @@
           <a:chExt cx="0" cy="0"/>
         </a:xfrm>
       </p:grpSpPr>
-      <p:sp>
-        <p:nvSpPr>
-          <p:cNvPr id="7" name="Content Placeholder 6">
-            <a:extLst>
-              <a:ext uri="{FF2B5EF4-FFF2-40B4-BE49-F238E27FC236}">
-                <a16:creationId xmlns:a16="http://schemas.microsoft.com/office/drawing/2014/main" id="{F5D825C3-61CB-46BB-8DEE-3D2910D54182}"/>
-              </a:ext>
-            </a:extLst>
-          </p:cNvPr>
-          <p:cNvSpPr>
-            <a:spLocks noGrp="1"/>
-          </p:cNvSpPr>
-          <p:nvPr>
-            <p:ph idx="1"/>
-          </p:nvPr>
-        </p:nvSpPr>
-        <p:spPr/>
-        <p:txBody>
-          <a:bodyPr/>
-          <a:lstStyle/>
-          <a:p>
-            <a:pPr marL="342900" indent="-342900">
-              <a:buFont typeface="Arial" panose="020B0604020202020204" pitchFamily="34" charset="0"/>
-              <a:buChar char="•"/>
-            </a:pPr>
-            <a:r>
-              <a:rPr lang="de-DE" dirty="0"/>
-              <a:t>Oszillation</a:t>
-            </a:r>
-            <a:r>
-              <a:rPr lang="en-DE" dirty="0"/>
-              <a:t> der </a:t>
-            </a:r>
-            <a:r>
-              <a:rPr lang="en-DE" dirty="0" err="1"/>
-              <a:t>Simulationsergebnisse</a:t>
-            </a:r>
-            <a:endParaRPr lang="en-DE" dirty="0"/>
-          </a:p>
-          <a:p>
-            <a:pPr marL="342900" indent="-342900">
-              <a:buFont typeface="Arial" panose="020B0604020202020204" pitchFamily="34" charset="0"/>
-              <a:buChar char="•"/>
-            </a:pPr>
-            <a:r>
-              <a:rPr lang="de-DE" dirty="0"/>
-              <a:t>Motivation für das Prädiktor-Korrektor-Verfahren</a:t>
-            </a:r>
-          </a:p>
-          <a:p>
-            <a:pPr marL="342900" indent="-342900">
-              <a:buFont typeface="Arial" panose="020B0604020202020204" pitchFamily="34" charset="0"/>
-              <a:buChar char="•"/>
-            </a:pPr>
-            <a:r>
-              <a:rPr lang="de-DE" dirty="0"/>
-              <a:t>Implementierung</a:t>
-            </a:r>
-          </a:p>
-          <a:p>
-            <a:pPr marL="342900" indent="-342900">
-              <a:buFont typeface="Arial" panose="020B0604020202020204" pitchFamily="34" charset="0"/>
-              <a:buChar char="•"/>
-            </a:pPr>
-            <a:r>
-              <a:rPr lang="de-DE" dirty="0"/>
-              <a:t>Auswertung</a:t>
-            </a:r>
-            <a:endParaRPr lang="en-DE" dirty="0"/>
-          </a:p>
-          <a:p>
-            <a:pPr marL="577845" lvl="1" indent="-342900">
-              <a:buFont typeface="Symbol" panose="05050102010706020507" pitchFamily="18" charset="2"/>
-              <a:buChar char="-"/>
-            </a:pPr>
-            <a:r>
-              <a:rPr lang="en-DE" dirty="0" err="1"/>
-              <a:t>Vorabinformationen</a:t>
-            </a:r>
-            <a:endParaRPr lang="en-DE" dirty="0"/>
-          </a:p>
-          <a:p>
-            <a:pPr marL="577845" lvl="1" indent="-342900">
-              <a:buFont typeface="Symbol" panose="05050102010706020507" pitchFamily="18" charset="2"/>
-              <a:buChar char="-"/>
-            </a:pPr>
-            <a:r>
-              <a:rPr lang="en-DE" dirty="0" err="1"/>
-              <a:t>Simulationsergebnisse</a:t>
-            </a:r>
-            <a:r>
-              <a:rPr lang="en-DE" dirty="0"/>
-              <a:t> für </a:t>
-            </a:r>
-            <a:r>
-              <a:rPr lang="en-DE" dirty="0">
-                <a:sym typeface="Symbol" panose="05050102010706020507" pitchFamily="18" charset="2"/>
-              </a:rPr>
-              <a:t> = 2.0</a:t>
-            </a:r>
-          </a:p>
-          <a:p>
-            <a:pPr marL="577845" lvl="1" indent="-342900">
-              <a:buFont typeface="Symbol" panose="05050102010706020507" pitchFamily="18" charset="2"/>
-              <a:buChar char="-"/>
-            </a:pPr>
-            <a:r>
-              <a:rPr lang="en-DE" dirty="0" err="1"/>
-              <a:t>Simulationsergebnisse</a:t>
-            </a:r>
-            <a:r>
-              <a:rPr lang="en-DE" dirty="0"/>
-              <a:t> für </a:t>
-            </a:r>
-            <a:r>
-              <a:rPr lang="en-DE" dirty="0">
-                <a:sym typeface="Symbol" panose="05050102010706020507" pitchFamily="18" charset="2"/>
-              </a:rPr>
-              <a:t> = 3.5</a:t>
-            </a:r>
-          </a:p>
-          <a:p>
-            <a:pPr marL="577845" lvl="1" indent="-342900">
-              <a:buFont typeface="Symbol" panose="05050102010706020507" pitchFamily="18" charset="2"/>
-              <a:buChar char="-"/>
-            </a:pPr>
-            <a:r>
-              <a:rPr lang="de-DE" dirty="0"/>
-              <a:t>Simulationsergebnisse </a:t>
-            </a:r>
-            <a:r>
-              <a:rPr lang="en-DE" dirty="0"/>
-              <a:t>für </a:t>
-            </a:r>
-            <a:r>
-              <a:rPr lang="en-DE" dirty="0">
-                <a:sym typeface="Symbol" panose="05050102010706020507" pitchFamily="18" charset="2"/>
-              </a:rPr>
-              <a:t> = 5.0</a:t>
-            </a:r>
-          </a:p>
-          <a:p>
-            <a:pPr marL="577845" lvl="1" indent="-342900">
-              <a:buFont typeface="Symbol" panose="05050102010706020507" pitchFamily="18" charset="2"/>
-              <a:buChar char="-"/>
-            </a:pPr>
-            <a:r>
-              <a:rPr lang="en-DE" dirty="0" err="1">
-                <a:sym typeface="Symbol" panose="05050102010706020507" pitchFamily="18" charset="2"/>
-              </a:rPr>
-              <a:t>Wichtigste</a:t>
-            </a:r>
-            <a:r>
-              <a:rPr lang="en-DE" dirty="0">
-                <a:sym typeface="Symbol" panose="05050102010706020507" pitchFamily="18" charset="2"/>
-              </a:rPr>
-              <a:t> </a:t>
-            </a:r>
-            <a:r>
-              <a:rPr lang="en-DE" dirty="0" err="1">
-                <a:sym typeface="Symbol" panose="05050102010706020507" pitchFamily="18" charset="2"/>
-              </a:rPr>
-              <a:t>Resultate</a:t>
-            </a:r>
-            <a:endParaRPr lang="de-DE" dirty="0"/>
-          </a:p>
-          <a:p>
-            <a:pPr marL="342900" indent="-342900">
-              <a:buFont typeface="Arial" panose="020B0604020202020204" pitchFamily="34" charset="0"/>
-              <a:buChar char="•"/>
-            </a:pPr>
-            <a:r>
-              <a:rPr lang="de-DE" dirty="0"/>
-              <a:t>Abschluss</a:t>
-            </a:r>
-            <a:r>
-              <a:rPr lang="en-DE" dirty="0"/>
-              <a:t> und </a:t>
-            </a:r>
-            <a:r>
-              <a:rPr lang="en-DE" dirty="0" err="1"/>
-              <a:t>Ausblick</a:t>
-            </a:r>
-            <a:endParaRPr lang="en-DE" dirty="0"/>
-          </a:p>
-          <a:p>
-            <a:endParaRPr lang="en-DE" dirty="0"/>
-          </a:p>
-          <a:p>
-            <a:endParaRPr lang="de-DE" dirty="0"/>
-          </a:p>
-        </p:txBody>
-      </p:sp>
+      <mc:AlternateContent xmlns:mc="http://schemas.openxmlformats.org/markup-compatibility/2006" xmlns:a14="http://schemas.microsoft.com/office/drawing/2010/main">
+        <mc:Choice Requires="a14">
+          <p:sp>
+            <p:nvSpPr>
+              <p:cNvPr id="7" name="Content Placeholder 6">
+                <a:extLst>
+                  <a:ext uri="{FF2B5EF4-FFF2-40B4-BE49-F238E27FC236}">
+                    <a16:creationId xmlns:a16="http://schemas.microsoft.com/office/drawing/2014/main" id="{F5D825C3-61CB-46BB-8DEE-3D2910D54182}"/>
+                  </a:ext>
+                </a:extLst>
+              </p:cNvPr>
+              <p:cNvSpPr>
+                <a:spLocks noGrp="1"/>
+              </p:cNvSpPr>
+              <p:nvPr>
+                <p:ph idx="1"/>
+              </p:nvPr>
+            </p:nvSpPr>
+            <p:spPr/>
+            <p:txBody>
+              <a:bodyPr/>
+              <a:lstStyle/>
+              <a:p>
+                <a:pPr marL="342900" indent="-342900">
+                  <a:buFont typeface="Arial" panose="020B0604020202020204" pitchFamily="34" charset="0"/>
+                  <a:buChar char="•"/>
+                </a:pPr>
+                <a:r>
+                  <a:rPr lang="de-DE" dirty="0"/>
+                  <a:t>Oszillation</a:t>
+                </a:r>
+                <a:r>
+                  <a:rPr lang="en-DE" dirty="0"/>
+                  <a:t> der </a:t>
+                </a:r>
+                <a:r>
+                  <a:rPr lang="en-DE" dirty="0" err="1"/>
+                  <a:t>Simulationsergebnisse</a:t>
+                </a:r>
+                <a:endParaRPr lang="en-DE" dirty="0"/>
+              </a:p>
+              <a:p>
+                <a:pPr marL="342900" indent="-342900">
+                  <a:buFont typeface="Arial" panose="020B0604020202020204" pitchFamily="34" charset="0"/>
+                  <a:buChar char="•"/>
+                </a:pPr>
+                <a:r>
+                  <a:rPr lang="de-DE" dirty="0"/>
+                  <a:t>Motivation für das Prädiktor-Korrektor-Verfahren</a:t>
+                </a:r>
+              </a:p>
+              <a:p>
+                <a:pPr marL="342900" indent="-342900">
+                  <a:buFont typeface="Arial" panose="020B0604020202020204" pitchFamily="34" charset="0"/>
+                  <a:buChar char="•"/>
+                </a:pPr>
+                <a:r>
+                  <a:rPr lang="de-DE" dirty="0"/>
+                  <a:t>Implementierung</a:t>
+                </a:r>
+              </a:p>
+              <a:p>
+                <a:pPr marL="342900" indent="-342900">
+                  <a:buFont typeface="Arial" panose="020B0604020202020204" pitchFamily="34" charset="0"/>
+                  <a:buChar char="•"/>
+                </a:pPr>
+                <a:r>
+                  <a:rPr lang="de-DE" dirty="0"/>
+                  <a:t>Auswertung</a:t>
+                </a:r>
+                <a:endParaRPr lang="en-DE" dirty="0"/>
+              </a:p>
+              <a:p>
+                <a:pPr marL="577845" lvl="1" indent="-342900">
+                  <a:buFont typeface="Symbol" panose="05050102010706020507" pitchFamily="18" charset="2"/>
+                  <a:buChar char="-"/>
+                </a:pPr>
+                <a:r>
+                  <a:rPr lang="en-DE" dirty="0" err="1"/>
+                  <a:t>Vorabinformationen</a:t>
+                </a:r>
+                <a:endParaRPr lang="en-DE" dirty="0"/>
+              </a:p>
+              <a:p>
+                <a:pPr marL="577845" lvl="1" indent="-342900">
+                  <a:buFont typeface="Symbol" panose="05050102010706020507" pitchFamily="18" charset="2"/>
+                  <a:buChar char="-"/>
+                </a:pPr>
+                <a:r>
+                  <a:rPr lang="en-DE" dirty="0" err="1"/>
+                  <a:t>Simulationsergebnisse</a:t>
+                </a:r>
+                <a:r>
+                  <a:rPr lang="en-DE" dirty="0"/>
+                  <a:t> für </a:t>
+                </a:r>
+                <a14:m>
+                  <m:oMath xmlns:m="http://schemas.openxmlformats.org/officeDocument/2006/math">
+                    <m:sSub>
+                      <m:sSubPr>
+                        <m:ctrlPr>
+                          <a:rPr lang="en-DE" i="1" smtClean="0">
+                            <a:latin typeface="Cambria Math" panose="02040503050406030204" pitchFamily="18" charset="0"/>
+                            <a:sym typeface="Symbol" panose="05050102010706020507" pitchFamily="18" charset="2"/>
+                          </a:rPr>
+                        </m:ctrlPr>
+                      </m:sSubPr>
+                      <m:e>
+                        <m:r>
+                          <a:rPr lang="en-DE" i="1" smtClean="0">
+                            <a:latin typeface="Cambria Math" panose="02040503050406030204" pitchFamily="18" charset="0"/>
+                            <a:ea typeface="Cambria Math" panose="02040503050406030204" pitchFamily="18" charset="0"/>
+                            <a:sym typeface="Symbol" panose="05050102010706020507" pitchFamily="18" charset="2"/>
+                          </a:rPr>
+                          <m:t>𝜃</m:t>
+                        </m:r>
+                      </m:e>
+                      <m:sub>
+                        <m:r>
+                          <a:rPr lang="en-GB" b="0" i="1" smtClean="0">
+                            <a:latin typeface="Cambria Math" panose="02040503050406030204" pitchFamily="18" charset="0"/>
+                            <a:sym typeface="Symbol" panose="05050102010706020507" pitchFamily="18" charset="2"/>
+                          </a:rPr>
+                          <m:t>0</m:t>
+                        </m:r>
+                      </m:sub>
+                    </m:sSub>
+                  </m:oMath>
+                </a14:m>
+                <a:r>
+                  <a:rPr lang="en-GB" dirty="0">
+                    <a:sym typeface="Symbol" panose="05050102010706020507" pitchFamily="18" charset="2"/>
+                  </a:rPr>
+                  <a:t> </a:t>
+                </a:r>
+                <a:r>
+                  <a:rPr lang="en-DE" dirty="0">
+                    <a:sym typeface="Symbol" panose="05050102010706020507" pitchFamily="18" charset="2"/>
+                  </a:rPr>
+                  <a:t>= 2.0</a:t>
+                </a:r>
+              </a:p>
+              <a:p>
+                <a:pPr marL="577845" lvl="1" indent="-342900">
+                  <a:buFont typeface="Symbol" panose="05050102010706020507" pitchFamily="18" charset="2"/>
+                  <a:buChar char="-"/>
+                </a:pPr>
+                <a:r>
+                  <a:rPr lang="en-DE" dirty="0" err="1"/>
+                  <a:t>Simulationsergebnisse</a:t>
+                </a:r>
+                <a:r>
+                  <a:rPr lang="en-DE" dirty="0"/>
+                  <a:t> für </a:t>
+                </a:r>
+                <a14:m>
+                  <m:oMath xmlns:m="http://schemas.openxmlformats.org/officeDocument/2006/math">
+                    <m:sSub>
+                      <m:sSubPr>
+                        <m:ctrlPr>
+                          <a:rPr lang="en-DE" i="1" smtClean="0">
+                            <a:latin typeface="Cambria Math" panose="02040503050406030204" pitchFamily="18" charset="0"/>
+                            <a:sym typeface="Symbol" panose="05050102010706020507" pitchFamily="18" charset="2"/>
+                          </a:rPr>
+                        </m:ctrlPr>
+                      </m:sSubPr>
+                      <m:e>
+                        <m:r>
+                          <a:rPr lang="en-DE" i="1" smtClean="0">
+                            <a:latin typeface="Cambria Math" panose="02040503050406030204" pitchFamily="18" charset="0"/>
+                            <a:ea typeface="Cambria Math" panose="02040503050406030204" pitchFamily="18" charset="0"/>
+                            <a:sym typeface="Symbol" panose="05050102010706020507" pitchFamily="18" charset="2"/>
+                          </a:rPr>
+                          <m:t>𝜃</m:t>
+                        </m:r>
+                      </m:e>
+                      <m:sub>
+                        <m:r>
+                          <a:rPr lang="en-GB" b="0" i="1" smtClean="0">
+                            <a:latin typeface="Cambria Math" panose="02040503050406030204" pitchFamily="18" charset="0"/>
+                            <a:sym typeface="Symbol" panose="05050102010706020507" pitchFamily="18" charset="2"/>
+                          </a:rPr>
+                          <m:t>0</m:t>
+                        </m:r>
+                      </m:sub>
+                    </m:sSub>
+                  </m:oMath>
+                </a14:m>
+                <a:r>
+                  <a:rPr lang="en-GB" dirty="0">
+                    <a:sym typeface="Symbol" panose="05050102010706020507" pitchFamily="18" charset="2"/>
+                  </a:rPr>
+                  <a:t> </a:t>
+                </a:r>
+                <a:r>
+                  <a:rPr lang="en-DE" dirty="0">
+                    <a:sym typeface="Symbol" panose="05050102010706020507" pitchFamily="18" charset="2"/>
+                  </a:rPr>
+                  <a:t>= 3.5</a:t>
+                </a:r>
+              </a:p>
+              <a:p>
+                <a:pPr marL="577845" lvl="1" indent="-342900">
+                  <a:buFont typeface="Symbol" panose="05050102010706020507" pitchFamily="18" charset="2"/>
+                  <a:buChar char="-"/>
+                </a:pPr>
+                <a:r>
+                  <a:rPr lang="de-DE" dirty="0"/>
+                  <a:t>Simulationsergebnisse </a:t>
+                </a:r>
+                <a:r>
+                  <a:rPr lang="en-DE" dirty="0"/>
+                  <a:t>für </a:t>
+                </a:r>
+                <a14:m>
+                  <m:oMath xmlns:m="http://schemas.openxmlformats.org/officeDocument/2006/math">
+                    <m:sSub>
+                      <m:sSubPr>
+                        <m:ctrlPr>
+                          <a:rPr lang="en-DE" i="1" smtClean="0">
+                            <a:latin typeface="Cambria Math" panose="02040503050406030204" pitchFamily="18" charset="0"/>
+                            <a:sym typeface="Symbol" panose="05050102010706020507" pitchFamily="18" charset="2"/>
+                          </a:rPr>
+                        </m:ctrlPr>
+                      </m:sSubPr>
+                      <m:e>
+                        <m:r>
+                          <a:rPr lang="en-DE" i="1" smtClean="0">
+                            <a:latin typeface="Cambria Math" panose="02040503050406030204" pitchFamily="18" charset="0"/>
+                            <a:ea typeface="Cambria Math" panose="02040503050406030204" pitchFamily="18" charset="0"/>
+                            <a:sym typeface="Symbol" panose="05050102010706020507" pitchFamily="18" charset="2"/>
+                          </a:rPr>
+                          <m:t>𝜃</m:t>
+                        </m:r>
+                      </m:e>
+                      <m:sub>
+                        <m:r>
+                          <a:rPr lang="en-GB" b="0" i="1" smtClean="0">
+                            <a:latin typeface="Cambria Math" panose="02040503050406030204" pitchFamily="18" charset="0"/>
+                            <a:sym typeface="Symbol" panose="05050102010706020507" pitchFamily="18" charset="2"/>
+                          </a:rPr>
+                          <m:t>0</m:t>
+                        </m:r>
+                      </m:sub>
+                    </m:sSub>
+                  </m:oMath>
+                </a14:m>
+                <a:r>
+                  <a:rPr lang="en-DE" dirty="0">
+                    <a:sym typeface="Symbol" panose="05050102010706020507" pitchFamily="18" charset="2"/>
+                  </a:rPr>
+                  <a:t> = 5.0</a:t>
+                </a:r>
+              </a:p>
+              <a:p>
+                <a:pPr marL="577845" lvl="1" indent="-342900">
+                  <a:buFont typeface="Symbol" panose="05050102010706020507" pitchFamily="18" charset="2"/>
+                  <a:buChar char="-"/>
+                </a:pPr>
+                <a:r>
+                  <a:rPr lang="en-DE" dirty="0" err="1">
+                    <a:sym typeface="Symbol" panose="05050102010706020507" pitchFamily="18" charset="2"/>
+                  </a:rPr>
+                  <a:t>Wichtigste</a:t>
+                </a:r>
+                <a:r>
+                  <a:rPr lang="en-DE" dirty="0">
+                    <a:sym typeface="Symbol" panose="05050102010706020507" pitchFamily="18" charset="2"/>
+                  </a:rPr>
+                  <a:t> </a:t>
+                </a:r>
+                <a:r>
+                  <a:rPr lang="en-DE" dirty="0" err="1">
+                    <a:sym typeface="Symbol" panose="05050102010706020507" pitchFamily="18" charset="2"/>
+                  </a:rPr>
+                  <a:t>Resultate</a:t>
+                </a:r>
+                <a:endParaRPr lang="de-DE" dirty="0"/>
+              </a:p>
+              <a:p>
+                <a:pPr marL="342900" indent="-342900">
+                  <a:buFont typeface="Arial" panose="020B0604020202020204" pitchFamily="34" charset="0"/>
+                  <a:buChar char="•"/>
+                </a:pPr>
+                <a:r>
+                  <a:rPr lang="de-DE" dirty="0"/>
+                  <a:t>Abschluss</a:t>
+                </a:r>
+                <a:r>
+                  <a:rPr lang="en-DE" dirty="0"/>
+                  <a:t> und </a:t>
+                </a:r>
+                <a:r>
+                  <a:rPr lang="en-DE" dirty="0" err="1"/>
+                  <a:t>Ausblick</a:t>
+                </a:r>
+                <a:endParaRPr lang="en-DE" dirty="0"/>
+              </a:p>
+              <a:p>
+                <a:endParaRPr lang="de-DE" dirty="0"/>
+              </a:p>
+              <a:p>
+                <a:endParaRPr lang="de-DE" dirty="0"/>
+              </a:p>
+            </p:txBody>
+          </p:sp>
+        </mc:Choice>
+        <mc:Fallback xmlns="">
+          <p:sp>
+            <p:nvSpPr>
+              <p:cNvPr id="7" name="Content Placeholder 6">
+                <a:extLst>
+                  <a:ext uri="{FF2B5EF4-FFF2-40B4-BE49-F238E27FC236}">
+                    <a16:creationId xmlns:a16="http://schemas.microsoft.com/office/drawing/2014/main" id="{F5D825C3-61CB-46BB-8DEE-3D2910D54182}"/>
+                  </a:ext>
+                </a:extLst>
+              </p:cNvPr>
+              <p:cNvSpPr>
+                <a:spLocks noGrp="1" noRot="1" noChangeAspect="1" noMove="1" noResize="1" noEditPoints="1" noAdjustHandles="1" noChangeArrowheads="1" noChangeShapeType="1" noTextEdit="1"/>
+              </p:cNvSpPr>
+              <p:nvPr>
+                <p:ph idx="1"/>
+              </p:nvPr>
+            </p:nvSpPr>
+            <p:spPr>
+              <a:blipFill>
+                <a:blip r:embed="rId2"/>
+                <a:stretch>
+                  <a:fillRect l="-1182" t="-1477"/>
+                </a:stretch>
+              </a:blipFill>
+            </p:spPr>
+            <p:txBody>
+              <a:bodyPr/>
+              <a:lstStyle/>
+              <a:p>
+                <a:r>
+                  <a:rPr lang="en-DE">
+                    <a:noFill/>
+                  </a:rPr>
+                  <a:t> </a:t>
+                </a:r>
+              </a:p>
+            </p:txBody>
+          </p:sp>
+        </mc:Fallback>
+      </mc:AlternateContent>
       <p:sp>
         <p:nvSpPr>
           <p:cNvPr id="6" name="Title 5">
@@ -9795,105 +9918,266 @@
           <a:chExt cx="0" cy="0"/>
         </a:xfrm>
       </p:grpSpPr>
-      <p:sp>
-        <p:nvSpPr>
-          <p:cNvPr id="22" name="Content Placeholder 1">
-            <a:extLst>
-              <a:ext uri="{FF2B5EF4-FFF2-40B4-BE49-F238E27FC236}">
-                <a16:creationId xmlns:a16="http://schemas.microsoft.com/office/drawing/2014/main" id="{A97B58B1-66E3-4F7A-96A9-D569719D8952}"/>
-              </a:ext>
-            </a:extLst>
-          </p:cNvPr>
-          <p:cNvSpPr>
-            <a:spLocks noGrp="1"/>
-          </p:cNvSpPr>
-          <p:nvPr>
-            <p:ph idx="14"/>
-          </p:nvPr>
-        </p:nvSpPr>
-        <p:spPr>
-          <a:xfrm>
-            <a:off x="425455" y="2136000"/>
-            <a:ext cx="5574547" cy="4127501"/>
-          </a:xfrm>
-        </p:spPr>
-        <p:txBody>
-          <a:bodyPr/>
-          <a:lstStyle/>
-          <a:p>
-            <a:r>
-              <a:rPr lang="de-DE"/>
-              <a:t>Simulationsparameter:</a:t>
-            </a:r>
-          </a:p>
-          <a:p>
-            <a:pPr marL="342900" indent="-342900">
-              <a:buFont typeface="Arial" panose="020B0604020202020204" pitchFamily="34" charset="0"/>
-              <a:buChar char="•"/>
-            </a:pPr>
-            <a:r>
-              <a:rPr lang="de-DE"/>
-              <a:t>Simulationszeit: 2 Jahre</a:t>
-            </a:r>
-          </a:p>
-          <a:p>
-            <a:pPr marL="342900" indent="-342900">
-              <a:buFont typeface="Arial" panose="020B0604020202020204" pitchFamily="34" charset="0"/>
-              <a:buChar char="•"/>
-            </a:pPr>
-            <a:r>
-              <a:rPr lang="de-DE"/>
-              <a:t>Anzahl der Iterationen: 1000</a:t>
-            </a:r>
-          </a:p>
-          <a:p>
-            <a:pPr marL="342900" indent="-342900">
-              <a:buFont typeface="Arial" panose="020B0604020202020204" pitchFamily="34" charset="0"/>
-              <a:buChar char="•"/>
-            </a:pPr>
-            <a:r>
-              <a:rPr lang="de-DE"/>
-              <a:t>Anzahl der simulierten Teilchen: mind. 10 000</a:t>
-            </a:r>
-          </a:p>
-          <a:p>
-            <a:pPr marL="342900" indent="-342900">
-              <a:buFont typeface="Arial" panose="020B0604020202020204" pitchFamily="34" charset="0"/>
-              <a:buChar char="•"/>
-            </a:pPr>
-            <a:r>
-              <a:rPr lang="de-DE"/>
-              <a:t>Schrittweite: min: 1 </a:t>
-            </a:r>
-            <a:r>
-              <a:rPr lang="de-DE">
-                <a:sym typeface="Symbol" panose="05050102010706020507" pitchFamily="18" charset="2"/>
-              </a:rPr>
-              <a:t>s, </a:t>
-            </a:r>
-            <a:r>
-              <a:rPr lang="de-DE" err="1">
-                <a:sym typeface="Symbol" panose="05050102010706020507" pitchFamily="18" charset="2"/>
-              </a:rPr>
-              <a:t>max</a:t>
-            </a:r>
-            <a:r>
-              <a:rPr lang="de-DE">
-                <a:sym typeface="Symbol" panose="05050102010706020507" pitchFamily="18" charset="2"/>
-              </a:rPr>
-              <a:t>: unbegrenzt</a:t>
-            </a:r>
-            <a:endParaRPr lang="de-DE"/>
-          </a:p>
-          <a:p>
-            <a:pPr marL="342900" indent="-342900">
-              <a:buFont typeface="Arial" panose="020B0604020202020204" pitchFamily="34" charset="0"/>
-              <a:buChar char="•"/>
-            </a:pPr>
-            <a:endParaRPr lang="en-US"/>
-          </a:p>
-        </p:txBody>
-      </p:sp>
+      <mc:AlternateContent xmlns:mc="http://schemas.openxmlformats.org/markup-compatibility/2006">
+        <mc:Choice xmlns:a14="http://schemas.microsoft.com/office/drawing/2010/main" Requires="a14">
+          <p:sp>
+            <p:nvSpPr>
+              <p:cNvPr id="22" name="Content Placeholder 1">
+                <a:extLst>
+                  <a:ext uri="{FF2B5EF4-FFF2-40B4-BE49-F238E27FC236}">
+                    <a16:creationId xmlns:a16="http://schemas.microsoft.com/office/drawing/2014/main" id="{A97B58B1-66E3-4F7A-96A9-D569719D8952}"/>
+                  </a:ext>
+                </a:extLst>
+              </p:cNvPr>
+              <p:cNvSpPr>
+                <a:spLocks noGrp="1"/>
+              </p:cNvSpPr>
+              <p:nvPr>
+                <p:ph idx="14"/>
+              </p:nvPr>
+            </p:nvSpPr>
+            <p:spPr>
+              <a:xfrm>
+                <a:off x="425455" y="2136000"/>
+                <a:ext cx="5574547" cy="4127501"/>
+              </a:xfrm>
+            </p:spPr>
+            <p:txBody>
+              <a:bodyPr/>
+              <a:lstStyle/>
+              <a:p>
+                <a:pPr marL="342900" indent="-342900">
+                  <a:buFont typeface="Arial" panose="020B0604020202020204" pitchFamily="34" charset="0"/>
+                  <a:buChar char="•"/>
+                </a:pPr>
+                <a:r>
+                  <a:rPr lang="de-DE" dirty="0"/>
+                  <a:t>Simulationsparameter:</a:t>
+                </a:r>
+              </a:p>
+              <a:p>
+                <a:pPr marL="577845" lvl="1" indent="-342900">
+                  <a:buFont typeface="Symbol" panose="05050102010706020507" pitchFamily="18" charset="2"/>
+                  <a:buChar char=""/>
+                </a:pPr>
+                <a:r>
+                  <a:rPr lang="de-DE" dirty="0"/>
+                  <a:t>Simulationszeit: 2 Jahre</a:t>
+                </a:r>
+              </a:p>
+              <a:p>
+                <a:pPr marL="577845" lvl="1" indent="-342900">
+                  <a:buFont typeface="Symbol" panose="05050102010706020507" pitchFamily="18" charset="2"/>
+                  <a:buChar char=""/>
+                </a:pPr>
+                <a:r>
+                  <a:rPr lang="de-DE" dirty="0"/>
+                  <a:t>Anzahl der Iterationen: 1000</a:t>
+                </a:r>
+              </a:p>
+              <a:p>
+                <a:pPr marL="577845" lvl="1" indent="-342900">
+                  <a:buFont typeface="Symbol" panose="05050102010706020507" pitchFamily="18" charset="2"/>
+                  <a:buChar char=""/>
+                </a:pPr>
+                <a:r>
+                  <a:rPr lang="de-DE" dirty="0"/>
+                  <a:t>Anzahl der simulierten Teilchen: mind. 10000</a:t>
+                </a:r>
+              </a:p>
+              <a:p>
+                <a:pPr marL="577845" lvl="1" indent="-342900">
+                  <a:buFont typeface="Symbol" panose="05050102010706020507" pitchFamily="18" charset="2"/>
+                  <a:buChar char=""/>
+                </a:pPr>
+                <a:r>
+                  <a:rPr lang="de-DE" dirty="0"/>
+                  <a:t>Schrittweite: min. 1 </a:t>
+                </a:r>
+                <a:r>
+                  <a:rPr lang="de-DE" dirty="0">
+                    <a:sym typeface="Symbol" panose="05050102010706020507" pitchFamily="18" charset="2"/>
+                  </a:rPr>
+                  <a:t>s; max. </a:t>
+                </a:r>
+                <a:r>
+                  <a:rPr lang="en-DE" dirty="0">
+                    <a:sym typeface="Symbol" panose="05050102010706020507" pitchFamily="18" charset="2"/>
+                  </a:rPr>
+                  <a:t>u</a:t>
+                </a:r>
+                <a:r>
+                  <a:rPr lang="de-DE" dirty="0" err="1">
+                    <a:sym typeface="Symbol" panose="05050102010706020507" pitchFamily="18" charset="2"/>
+                  </a:rPr>
+                  <a:t>nbegrenzt</a:t>
+                </a:r>
+                <a:endParaRPr lang="en-DE" dirty="0">
+                  <a:sym typeface="Symbol" panose="05050102010706020507" pitchFamily="18" charset="2"/>
+                </a:endParaRPr>
+              </a:p>
+              <a:p>
+                <a:pPr lvl="1" indent="0">
+                  <a:buNone/>
+                </a:pPr>
+                <a:endParaRPr lang="en-DE" dirty="0">
+                  <a:sym typeface="Symbol" panose="05050102010706020507" pitchFamily="18" charset="2"/>
+                </a:endParaRPr>
+              </a:p>
+              <a:p>
+                <a:pPr marL="342900" indent="-342900">
+                  <a:buFont typeface="Arial" panose="020B0604020202020204" pitchFamily="34" charset="0"/>
+                  <a:buChar char="•"/>
+                </a:pPr>
+                <a:r>
+                  <a:rPr lang="en-DE" dirty="0" err="1">
+                    <a:sym typeface="Symbol" panose="05050102010706020507" pitchFamily="18" charset="2"/>
+                  </a:rPr>
+                  <a:t>Oszillationbeginn</a:t>
+                </a:r>
+                <a:r>
+                  <a:rPr lang="en-DE" dirty="0">
+                    <a:sym typeface="Symbol" panose="05050102010706020507" pitchFamily="18" charset="2"/>
+                  </a:rPr>
+                  <a:t>: </a:t>
+                </a:r>
+                <a14:m>
+                  <m:oMath xmlns:m="http://schemas.openxmlformats.org/officeDocument/2006/math">
+                    <m:sSup>
+                      <m:sSupPr>
+                        <m:ctrlPr>
+                          <a:rPr lang="en-DE" i="1" smtClean="0">
+                            <a:latin typeface="Cambria Math" panose="02040503050406030204" pitchFamily="18" charset="0"/>
+                            <a:sym typeface="Symbol" panose="05050102010706020507" pitchFamily="18" charset="2"/>
+                          </a:rPr>
+                        </m:ctrlPr>
+                      </m:sSupPr>
+                      <m:e>
+                        <m:r>
+                          <a:rPr lang="en-DE" b="0" i="1" smtClean="0">
+                            <a:latin typeface="Cambria Math" panose="02040503050406030204" pitchFamily="18" charset="0"/>
+                            <a:sym typeface="Symbol" panose="05050102010706020507" pitchFamily="18" charset="2"/>
+                          </a:rPr>
+                          <m:t>10</m:t>
+                        </m:r>
+                      </m:e>
+                      <m:sup>
+                        <m:r>
+                          <a:rPr lang="en-DE" b="0" i="1" smtClean="0">
+                            <a:latin typeface="Cambria Math" panose="02040503050406030204" pitchFamily="18" charset="0"/>
+                            <a:sym typeface="Symbol" panose="05050102010706020507" pitchFamily="18" charset="2"/>
+                          </a:rPr>
+                          <m:t>6</m:t>
+                        </m:r>
+                      </m:sup>
+                    </m:sSup>
+                  </m:oMath>
+                </a14:m>
+                <a:r>
+                  <a:rPr lang="en-DE" dirty="0">
+                    <a:sym typeface="Symbol" panose="05050102010706020507" pitchFamily="18" charset="2"/>
+                  </a:rPr>
+                  <a:t> s = 116. Tag</a:t>
+                </a:r>
+              </a:p>
+              <a:p>
+                <a:pPr marL="342900" indent="-342900">
+                  <a:buFont typeface="Arial" panose="020B0604020202020204" pitchFamily="34" charset="0"/>
+                  <a:buChar char="•"/>
+                </a:pPr>
+                <a:r>
+                  <a:rPr lang="en-DE" dirty="0" err="1">
+                    <a:sym typeface="Symbol" panose="05050102010706020507" pitchFamily="18" charset="2"/>
+                  </a:rPr>
+                  <a:t>Schrittweite</a:t>
+                </a:r>
+                <a:r>
+                  <a:rPr lang="en-DE" dirty="0">
+                    <a:sym typeface="Symbol" panose="05050102010706020507" pitchFamily="18" charset="2"/>
+                  </a:rPr>
+                  <a:t> </a:t>
+                </a:r>
+                <a:r>
+                  <a:rPr lang="en-DE" dirty="0" err="1">
+                    <a:sym typeface="Symbol" panose="05050102010706020507" pitchFamily="18" charset="2"/>
+                  </a:rPr>
+                  <a:t>beim</a:t>
+                </a:r>
+                <a:r>
+                  <a:rPr lang="en-DE" dirty="0">
+                    <a:sym typeface="Symbol" panose="05050102010706020507" pitchFamily="18" charset="2"/>
+                  </a:rPr>
+                  <a:t> </a:t>
+                </a:r>
+                <a:r>
+                  <a:rPr lang="en-DE" dirty="0" err="1">
+                    <a:sym typeface="Symbol" panose="05050102010706020507" pitchFamily="18" charset="2"/>
+                  </a:rPr>
+                  <a:t>Oszillationsbeginn</a:t>
+                </a:r>
+                <a:r>
+                  <a:rPr lang="en-DE" dirty="0">
+                    <a:sym typeface="Symbol" panose="05050102010706020507" pitchFamily="18" charset="2"/>
+                  </a:rPr>
+                  <a:t>: 18 </a:t>
+                </a:r>
+                <a:r>
+                  <a:rPr lang="en-DE" dirty="0" err="1">
+                    <a:sym typeface="Symbol" panose="05050102010706020507" pitchFamily="18" charset="2"/>
+                  </a:rPr>
+                  <a:t>Stunden</a:t>
+                </a:r>
+                <a:endParaRPr lang="en-DE" dirty="0">
+                  <a:sym typeface="Symbol" panose="05050102010706020507" pitchFamily="18" charset="2"/>
+                </a:endParaRPr>
+              </a:p>
+            </p:txBody>
+          </p:sp>
+        </mc:Choice>
+        <mc:Fallback>
+          <p:sp>
+            <p:nvSpPr>
+              <p:cNvPr id="22" name="Content Placeholder 1">
+                <a:extLst>
+                  <a:ext uri="{FF2B5EF4-FFF2-40B4-BE49-F238E27FC236}">
+                    <a16:creationId xmlns:a16="http://schemas.microsoft.com/office/drawing/2014/main" id="{A97B58B1-66E3-4F7A-96A9-D569719D8952}"/>
+                  </a:ext>
+                </a:extLst>
+              </p:cNvPr>
+              <p:cNvSpPr>
+                <a:spLocks noGrp="1" noRot="1" noChangeAspect="1" noMove="1" noResize="1" noEditPoints="1" noAdjustHandles="1" noChangeArrowheads="1" noChangeShapeType="1" noTextEdit="1"/>
+              </p:cNvSpPr>
+              <p:nvPr>
+                <p:ph idx="14"/>
+              </p:nvPr>
+            </p:nvSpPr>
+            <p:spPr>
+              <a:xfrm>
+                <a:off x="425455" y="2136000"/>
+                <a:ext cx="5574547" cy="4127501"/>
+              </a:xfrm>
+              <a:blipFill>
+                <a:blip r:embed="rId2"/>
+                <a:stretch>
+                  <a:fillRect l="-2407" t="-1477" r="-1094"/>
+                </a:stretch>
+              </a:blipFill>
+            </p:spPr>
+            <p:txBody>
+              <a:bodyPr/>
+              <a:lstStyle/>
+              <a:p>
+                <a:r>
+                  <a:rPr lang="en-DE">
+                    <a:noFill/>
+                  </a:rPr>
+                  <a:t> </a:t>
+                </a:r>
+              </a:p>
+            </p:txBody>
+          </p:sp>
+        </mc:Fallback>
+      </mc:AlternateContent>
       <p:pic>
         <p:nvPicPr>
           <p:cNvPr id="17" name="Content Placeholder 16" descr="Chart, line chart&#10;&#10;Description automatically generated">
@@ -9911,7 +10195,7 @@
           </p:nvPr>
         </p:nvPicPr>
         <p:blipFill>
-          <a:blip r:embed="rId2">
+          <a:blip r:embed="rId3">
             <a:extLst>
               <a:ext uri="{28A0092B-C50C-407E-A947-70E740481C1C}">
                 <a14:useLocalDpi xmlns:a14="http://schemas.microsoft.com/office/drawing/2010/main" val="0"/>
@@ -9960,7 +10244,7 @@
           <a:lstStyle/>
           <a:p>
             <a:r>
-              <a:rPr lang="de-DE"/>
+              <a:rPr lang="de-DE" dirty="0"/>
               <a:t>Oszillation der Simulationsergebnisse</a:t>
             </a:r>
           </a:p>
@@ -10268,65 +10552,6 @@
           </a:p>
         </p:txBody>
       </p:sp>
-      <p:sp>
-        <p:nvSpPr>
-          <p:cNvPr id="12" name="Rett linje 11">
-            <a:extLst>
-              <a:ext uri="{FF2B5EF4-FFF2-40B4-BE49-F238E27FC236}">
-                <a16:creationId xmlns:a16="http://schemas.microsoft.com/office/drawing/2014/main" id="{9E970B38-0E72-4831-B5DE-A5634C1BE875}"/>
-              </a:ext>
-            </a:extLst>
-          </p:cNvPr>
-          <p:cNvSpPr/>
-          <p:nvPr/>
-        </p:nvSpPr>
-        <p:spPr>
-          <a:xfrm rot="5400000">
-            <a:off x="4186835" y="4118279"/>
-            <a:ext cx="4166647" cy="6286"/>
-          </a:xfrm>
-          <a:prstGeom prst="line">
-            <a:avLst/>
-          </a:prstGeom>
-          <a:ln/>
-        </p:spPr>
-        <p:style>
-          <a:lnRef idx="3">
-            <a:schemeClr val="dk1"/>
-          </a:lnRef>
-          <a:fillRef idx="0">
-            <a:schemeClr val="dk1"/>
-          </a:fillRef>
-          <a:effectRef idx="2">
-            <a:schemeClr val="dk1"/>
-          </a:effectRef>
-          <a:fontRef idx="minor">
-            <a:schemeClr val="tx1"/>
-          </a:fontRef>
-        </p:style>
-        <p:txBody>
-          <a:bodyPr wrap="square" lIns="0" tIns="0" rIns="0" bIns="0" rtlCol="0" anchor="ctr" anchorCtr="1">
-            <a:spAutoFit/>
-          </a:bodyPr>
-          <a:lstStyle/>
-          <a:p>
-            <a:pPr>
-              <a:lnSpc>
-                <a:spcPct val="114000"/>
-              </a:lnSpc>
-              <a:defRPr sz="1600" dirty="0" err="1" smtClean="0">
-                <a:latin typeface="+mn-lt"/>
-              </a:defRPr>
-            </a:pPr>
-            <a:endParaRPr lang="en-US" sz="1600" dirty="0" err="1">
-              <a:solidFill>
-                <a:srgbClr val="000000"/>
-              </a:solidFill>
-              <a:latin typeface="+mn-lt"/>
-            </a:endParaRPr>
-          </a:p>
-        </p:txBody>
-      </p:sp>
       <p:pic>
         <p:nvPicPr>
           <p:cNvPr id="14" name="Inhaltsplatzhalter 13">
@@ -10357,7 +10582,7 @@
         </p:blipFill>
         <p:spPr>
           <a:xfrm>
-            <a:off x="6516125" y="2732909"/>
+            <a:off x="6574248" y="3137758"/>
             <a:ext cx="5408687" cy="2935230"/>
           </a:xfrm>
         </p:spPr>
@@ -10392,7 +10617,7 @@
         </p:blipFill>
         <p:spPr>
           <a:xfrm>
-            <a:off x="425450" y="2447785"/>
+            <a:off x="209065" y="2447784"/>
             <a:ext cx="5575300" cy="3505480"/>
           </a:xfrm>
         </p:spPr>
@@ -10427,8 +10652,8 @@
           <a:chExt cx="0" cy="0"/>
         </a:xfrm>
       </p:grpSpPr>
-      <mc:AlternateContent xmlns:mc="http://schemas.openxmlformats.org/markup-compatibility/2006" xmlns:a14="http://schemas.microsoft.com/office/drawing/2010/main">
-        <mc:Choice Requires="a14">
+      <mc:AlternateContent xmlns:mc="http://schemas.openxmlformats.org/markup-compatibility/2006">
+        <mc:Choice xmlns:a14="http://schemas.microsoft.com/office/drawing/2010/main" Requires="a14">
           <p:sp>
             <p:nvSpPr>
               <p:cNvPr id="2" name="Content Placeholder 1">
@@ -10450,15 +10675,19 @@
               <a:bodyPr/>
               <a:lstStyle/>
               <a:p>
+                <a:pPr marL="342900" indent="-342900">
+                  <a:buFont typeface="Arial" panose="020B0604020202020204" pitchFamily="34" charset="0"/>
+                  <a:buChar char="•"/>
+                </a:pPr>
                 <a:r>
                   <a:rPr lang="de-DE" dirty="0"/>
-                  <a:t>Simulationsparameter:</a:t>
+                  <a:t>Simulationsparameter</a:t>
                 </a:r>
               </a:p>
               <a:p>
-                <a:pPr marL="342900" indent="-342900">
-                  <a:buFont typeface="Arial" panose="020B0604020202020204" pitchFamily="34" charset="0"/>
-                  <a:buChar char="•"/>
+                <a:pPr marL="577845" lvl="1" indent="-342900">
+                  <a:buFont typeface="Symbol" panose="05050102010706020507" pitchFamily="18" charset="2"/>
+                  <a:buChar char=""/>
                 </a:pPr>
                 <a:r>
                   <a:rPr lang="de-DE" dirty="0"/>
@@ -10466,9 +10695,9 @@
                 </a:r>
               </a:p>
               <a:p>
-                <a:pPr marL="342900" indent="-342900">
-                  <a:buFont typeface="Arial" panose="020B0604020202020204" pitchFamily="34" charset="0"/>
-                  <a:buChar char="•"/>
+                <a:pPr marL="577845" lvl="1" indent="-342900">
+                  <a:buFont typeface="Symbol" panose="05050102010706020507" pitchFamily="18" charset="2"/>
+                  <a:buChar char=""/>
                 </a:pPr>
                 <a:r>
                   <a:rPr lang="de-DE" dirty="0"/>
@@ -10476,9 +10705,9 @@
                 </a:r>
               </a:p>
               <a:p>
-                <a:pPr marL="342900" indent="-342900">
-                  <a:buFont typeface="Arial" panose="020B0604020202020204" pitchFamily="34" charset="0"/>
-                  <a:buChar char="•"/>
+                <a:pPr marL="577845" lvl="1" indent="-342900">
+                  <a:buFont typeface="Symbol" panose="05050102010706020507" pitchFamily="18" charset="2"/>
+                  <a:buChar char=""/>
                 </a:pPr>
                 <a:r>
                   <a:rPr lang="de-DE" dirty="0"/>
@@ -10486,9 +10715,9 @@
                 </a:r>
               </a:p>
               <a:p>
-                <a:pPr marL="342900" indent="-342900">
-                  <a:buFont typeface="Arial" panose="020B0604020202020204" pitchFamily="34" charset="0"/>
-                  <a:buChar char="•"/>
+                <a:pPr marL="577845" lvl="1" indent="-342900">
+                  <a:buFont typeface="Symbol" panose="05050102010706020507" pitchFamily="18" charset="2"/>
+                  <a:buChar char=""/>
                 </a:pPr>
                 <a:r>
                   <a:rPr lang="de-DE" dirty="0"/>
@@ -10506,16 +10735,69 @@
                   <a:rPr lang="de-DE" dirty="0">
                     <a:sym typeface="Symbol" panose="05050102010706020507" pitchFamily="18" charset="2"/>
                   </a:rPr>
-                  <a:t>s, max. unbegrenzt</a:t>
+                  <a:t>s; max. unbegrenzt</a:t>
                 </a:r>
                 <a:endParaRPr lang="en-DE" dirty="0">
                   <a:sym typeface="Symbol" panose="05050102010706020507" pitchFamily="18" charset="2"/>
                 </a:endParaRPr>
               </a:p>
               <a:p>
-                <a:pPr marL="342900" indent="-342900">
-                  <a:buFont typeface="Arial" panose="020B0604020202020204" pitchFamily="34" charset="0"/>
-                  <a:buChar char="•"/>
+                <a:pPr marL="577845" lvl="1" indent="-342900">
+                  <a:buFont typeface="Symbol" panose="05050102010706020507" pitchFamily="18" charset="2"/>
+                  <a:buChar char=""/>
+                </a:pPr>
+                <a:r>
+                  <a:rPr lang="en-DE" dirty="0" err="1">
+                    <a:sym typeface="Symbol" panose="05050102010706020507" pitchFamily="18" charset="2"/>
+                  </a:rPr>
+                  <a:t>Temperatur</a:t>
+                </a:r>
+                <a:r>
+                  <a:rPr lang="en-DE" dirty="0">
+                    <a:sym typeface="Symbol" panose="05050102010706020507" pitchFamily="18" charset="2"/>
+                  </a:rPr>
+                  <a:t> </a:t>
+                </a:r>
+                <a:r>
+                  <a:rPr lang="en-DE" dirty="0" err="1">
+                    <a:sym typeface="Symbol" panose="05050102010706020507" pitchFamily="18" charset="2"/>
+                  </a:rPr>
+                  <a:t>aller</a:t>
+                </a:r>
+                <a:r>
+                  <a:rPr lang="en-DE" dirty="0">
+                    <a:sym typeface="Symbol" panose="05050102010706020507" pitchFamily="18" charset="2"/>
+                  </a:rPr>
+                  <a:t> </a:t>
+                </a:r>
+                <a:r>
+                  <a:rPr lang="en-DE" dirty="0" err="1">
+                    <a:sym typeface="Symbol" panose="05050102010706020507" pitchFamily="18" charset="2"/>
+                  </a:rPr>
+                  <a:t>Oberflächen</a:t>
+                </a:r>
+                <a:r>
+                  <a:rPr lang="en-DE" dirty="0">
+                    <a:sym typeface="Symbol" panose="05050102010706020507" pitchFamily="18" charset="2"/>
+                  </a:rPr>
+                  <a:t>: 20 </a:t>
+                </a:r>
+                <a:r>
+                  <a:rPr lang="en-DE" dirty="0">
+                    <a:latin typeface="Arial" panose="020B0604020202020204" pitchFamily="34" charset="0"/>
+                    <a:cs typeface="Arial" panose="020B0604020202020204" pitchFamily="34" charset="0"/>
+                    <a:sym typeface="Symbol" panose="05050102010706020507" pitchFamily="18" charset="2"/>
+                  </a:rPr>
+                  <a:t>°C</a:t>
+                </a:r>
+                <a:endParaRPr lang="en-DE" dirty="0">
+                  <a:sym typeface="Symbol" panose="05050102010706020507" pitchFamily="18" charset="2"/>
+                </a:endParaRPr>
+              </a:p>
+              <a:p>
+                <a:pPr marL="577845" lvl="1" indent="-342900">
+                  <a:buFont typeface="Symbol" panose="05050102010706020507" pitchFamily="18" charset="2"/>
+                  <a:buChar char=""/>
                 </a:pPr>
                 <a14:m>
                   <m:oMath xmlns:m="http://schemas.openxmlformats.org/officeDocument/2006/math">
@@ -10571,7 +10853,7 @@
             </p:txBody>
           </p:sp>
         </mc:Choice>
-        <mc:Fallback xmlns="">
+        <mc:Fallback>
           <p:sp>
             <p:nvSpPr>
               <p:cNvPr id="2" name="Content Placeholder 1">
@@ -10592,7 +10874,7 @@
               <a:blipFill>
                 <a:blip r:embed="rId2"/>
                 <a:stretch>
-                  <a:fillRect l="-2626" t="-1477"/>
+                  <a:fillRect l="-2407" t="-1477"/>
                 </a:stretch>
               </a:blipFill>
             </p:spPr>
@@ -10601,7 +10883,7 @@
               <a:lstStyle/>
               <a:p>
                 <a:r>
-                  <a:rPr lang="de-DE">
+                  <a:rPr lang="en-DE">
                     <a:noFill/>
                   </a:rPr>
                   <a:t> </a:t>
@@ -10668,7 +10950,7 @@
           <a:lstStyle/>
           <a:p>
             <a:r>
-              <a:rPr lang="de-DE"/>
+              <a:rPr lang="de-DE" dirty="0"/>
               <a:t>Auswertung - Vorabinformationen</a:t>
             </a:r>
           </a:p>
@@ -10734,55 +11016,135 @@
           <a:chExt cx="0" cy="0"/>
         </a:xfrm>
       </p:grpSpPr>
-      <p:sp>
-        <p:nvSpPr>
-          <p:cNvPr id="4" name="Title 3">
-            <a:extLst>
-              <a:ext uri="{FF2B5EF4-FFF2-40B4-BE49-F238E27FC236}">
-                <a16:creationId xmlns:a16="http://schemas.microsoft.com/office/drawing/2014/main" id="{ED5AAF87-5132-49A2-BA4B-F60CA9B9AE29}"/>
-              </a:ext>
-            </a:extLst>
-          </p:cNvPr>
-          <p:cNvSpPr>
-            <a:spLocks noGrp="1"/>
-          </p:cNvSpPr>
-          <p:nvPr>
-            <p:ph type="title"/>
-          </p:nvPr>
-        </p:nvSpPr>
-        <p:spPr>
-          <a:xfrm>
-            <a:off x="425454" y="1296001"/>
-            <a:ext cx="11345332" cy="1062342"/>
-          </a:xfrm>
-        </p:spPr>
-        <p:txBody>
-          <a:bodyPr/>
-          <a:lstStyle/>
-          <a:p>
-            <a:r>
-              <a:rPr lang="de-DE"/>
-              <a:t>Auswertung - Sulationsergebnisse</a:t>
-            </a:r>
-            <a:r>
-              <a:rPr lang="en-DE"/>
-              <a:t> für </a:t>
-            </a:r>
-            <a:r>
-              <a:rPr lang="en-DE">
-                <a:sym typeface="Symbol" panose="05050102010706020507" pitchFamily="18" charset="2"/>
-              </a:rPr>
-              <a:t> = 2.0</a:t>
-            </a:r>
-            <a:br>
-              <a:rPr lang="en-DE">
-                <a:sym typeface="Symbol" panose="05050102010706020507" pitchFamily="18" charset="2"/>
-              </a:rPr>
-            </a:br>
-            <a:endParaRPr lang="de-DE"/>
-          </a:p>
-        </p:txBody>
-      </p:sp>
+      <mc:AlternateContent xmlns:mc="http://schemas.openxmlformats.org/markup-compatibility/2006" xmlns:a14="http://schemas.microsoft.com/office/drawing/2010/main">
+        <mc:Choice Requires="a14">
+          <p:sp>
+            <p:nvSpPr>
+              <p:cNvPr id="4" name="Title 3">
+                <a:extLst>
+                  <a:ext uri="{FF2B5EF4-FFF2-40B4-BE49-F238E27FC236}">
+                    <a16:creationId xmlns:a16="http://schemas.microsoft.com/office/drawing/2014/main" id="{ED5AAF87-5132-49A2-BA4B-F60CA9B9AE29}"/>
+                  </a:ext>
+                </a:extLst>
+              </p:cNvPr>
+              <p:cNvSpPr>
+                <a:spLocks noGrp="1"/>
+              </p:cNvSpPr>
+              <p:nvPr>
+                <p:ph type="title"/>
+              </p:nvPr>
+            </p:nvSpPr>
+            <p:spPr>
+              <a:xfrm>
+                <a:off x="425454" y="1296001"/>
+                <a:ext cx="11345332" cy="1062342"/>
+              </a:xfrm>
+            </p:spPr>
+            <p:txBody>
+              <a:bodyPr/>
+              <a:lstStyle/>
+              <a:p>
+                <a:r>
+                  <a:rPr lang="de-DE" dirty="0"/>
+                  <a:t>Auswertung - Simulationsergebnisse</a:t>
+                </a:r>
+                <a:r>
+                  <a:rPr lang="en-DE" dirty="0"/>
+                  <a:t> für </a:t>
+                </a:r>
+                <a14:m>
+                  <m:oMath xmlns:m="http://schemas.openxmlformats.org/officeDocument/2006/math">
+                    <m:sSub>
+                      <m:sSubPr>
+                        <m:ctrlPr>
+                          <a:rPr lang="en-DE" i="1" smtClean="0">
+                            <a:latin typeface="Cambria Math" panose="02040503050406030204" pitchFamily="18" charset="0"/>
+                            <a:sym typeface="Symbol" panose="05050102010706020507" pitchFamily="18" charset="2"/>
+                          </a:rPr>
+                        </m:ctrlPr>
+                      </m:sSubPr>
+                      <m:e>
+                        <m:r>
+                          <a:rPr lang="en-DE" i="1" smtClean="0">
+                            <a:latin typeface="Cambria Math" panose="02040503050406030204" pitchFamily="18" charset="0"/>
+                            <a:ea typeface="Cambria Math" panose="02040503050406030204" pitchFamily="18" charset="0"/>
+                            <a:sym typeface="Symbol" panose="05050102010706020507" pitchFamily="18" charset="2"/>
+                          </a:rPr>
+                          <m:t>𝜃</m:t>
+                        </m:r>
+                      </m:e>
+                      <m:sub>
+                        <m:r>
+                          <a:rPr lang="en-GB" b="0" i="1" smtClean="0">
+                            <a:latin typeface="Cambria Math" panose="02040503050406030204" pitchFamily="18" charset="0"/>
+                            <a:sym typeface="Symbol" panose="05050102010706020507" pitchFamily="18" charset="2"/>
+                          </a:rPr>
+                          <m:t>0</m:t>
+                        </m:r>
+                      </m:sub>
+                    </m:sSub>
+                  </m:oMath>
+                </a14:m>
+                <a:r>
+                  <a:rPr lang="en-DE" dirty="0">
+                    <a:sym typeface="Symbol" panose="05050102010706020507" pitchFamily="18" charset="2"/>
+                  </a:rPr>
+                  <a:t> = 2.0</a:t>
+                </a:r>
+                <a:br>
+                  <a:rPr lang="en-DE" dirty="0">
+                    <a:sym typeface="Symbol" panose="05050102010706020507" pitchFamily="18" charset="2"/>
+                  </a:rPr>
+                </a:br>
+                <a:endParaRPr lang="de-DE" dirty="0"/>
+              </a:p>
+            </p:txBody>
+          </p:sp>
+        </mc:Choice>
+        <mc:Fallback xmlns="">
+          <p:sp>
+            <p:nvSpPr>
+              <p:cNvPr id="4" name="Title 3">
+                <a:extLst>
+                  <a:ext uri="{FF2B5EF4-FFF2-40B4-BE49-F238E27FC236}">
+                    <a16:creationId xmlns:a16="http://schemas.microsoft.com/office/drawing/2014/main" id="{ED5AAF87-5132-49A2-BA4B-F60CA9B9AE29}"/>
+                  </a:ext>
+                </a:extLst>
+              </p:cNvPr>
+              <p:cNvSpPr>
+                <a:spLocks noGrp="1" noRot="1" noChangeAspect="1" noMove="1" noResize="1" noEditPoints="1" noAdjustHandles="1" noChangeArrowheads="1" noChangeShapeType="1" noTextEdit="1"/>
+              </p:cNvSpPr>
+              <p:nvPr>
+                <p:ph type="title"/>
+              </p:nvPr>
+            </p:nvSpPr>
+            <p:spPr>
+              <a:xfrm>
+                <a:off x="425454" y="1296001"/>
+                <a:ext cx="11345332" cy="1062342"/>
+              </a:xfrm>
+              <a:blipFill>
+                <a:blip r:embed="rId3"/>
+                <a:stretch>
+                  <a:fillRect l="-2257" t="-12644"/>
+                </a:stretch>
+              </a:blipFill>
+            </p:spPr>
+            <p:txBody>
+              <a:bodyPr/>
+              <a:lstStyle/>
+              <a:p>
+                <a:r>
+                  <a:rPr lang="en-DE">
+                    <a:noFill/>
+                  </a:rPr>
+                  <a:t> </a:t>
+                </a:r>
+              </a:p>
+            </p:txBody>
+          </p:sp>
+        </mc:Fallback>
+      </mc:AlternateContent>
       <p:sp>
         <p:nvSpPr>
           <p:cNvPr id="5" name="Slide Number Placeholder 4">
@@ -10830,7 +11192,7 @@
           </p:nvPr>
         </p:nvPicPr>
         <p:blipFill>
-          <a:blip r:embed="rId3">
+          <a:blip r:embed="rId4">
             <a:extLst>
               <a:ext uri="{28A0092B-C50C-407E-A947-70E740481C1C}">
                 <a14:useLocalDpi xmlns:a14="http://schemas.microsoft.com/office/drawing/2010/main" val="0"/>
@@ -10861,7 +11223,7 @@
           </p:nvPr>
         </p:nvPicPr>
         <p:blipFill>
-          <a:blip r:embed="rId4">
+          <a:blip r:embed="rId5">
             <a:extLst>
               <a:ext uri="{28A0092B-C50C-407E-A947-70E740481C1C}">
                 <a14:useLocalDpi xmlns:a14="http://schemas.microsoft.com/office/drawing/2010/main" val="0"/>
@@ -10892,7 +11254,7 @@
           </p:nvPr>
         </p:nvPicPr>
         <p:blipFill>
-          <a:blip r:embed="rId5">
+          <a:blip r:embed="rId6">
             <a:extLst>
               <a:ext uri="{28A0092B-C50C-407E-A947-70E740481C1C}">
                 <a14:useLocalDpi xmlns:a14="http://schemas.microsoft.com/office/drawing/2010/main" val="0"/>
@@ -10923,7 +11285,7 @@
           </p:nvPr>
         </p:nvPicPr>
         <p:blipFill>
-          <a:blip r:embed="rId6">
+          <a:blip r:embed="rId7">
             <a:extLst>
               <a:ext uri="{28A0092B-C50C-407E-A947-70E740481C1C}">
                 <a14:useLocalDpi xmlns:a14="http://schemas.microsoft.com/office/drawing/2010/main" val="0"/>
@@ -10954,7 +11316,7 @@
           </p:nvPr>
         </p:nvPicPr>
         <p:blipFill>
-          <a:blip r:embed="rId7">
+          <a:blip r:embed="rId8">
             <a:extLst>
               <a:ext uri="{28A0092B-C50C-407E-A947-70E740481C1C}">
                 <a14:useLocalDpi xmlns:a14="http://schemas.microsoft.com/office/drawing/2010/main" val="0"/>
@@ -10985,7 +11347,7 @@
           </p:nvPr>
         </p:nvPicPr>
         <p:blipFill>
-          <a:blip r:embed="rId8">
+          <a:blip r:embed="rId9">
             <a:extLst>
               <a:ext uri="{28A0092B-C50C-407E-A947-70E740481C1C}">
                 <a14:useLocalDpi xmlns:a14="http://schemas.microsoft.com/office/drawing/2010/main" val="0"/>
@@ -11029,55 +11391,135 @@
           <a:chExt cx="0" cy="0"/>
         </a:xfrm>
       </p:grpSpPr>
-      <p:sp>
-        <p:nvSpPr>
-          <p:cNvPr id="4" name="Title 3">
-            <a:extLst>
-              <a:ext uri="{FF2B5EF4-FFF2-40B4-BE49-F238E27FC236}">
-                <a16:creationId xmlns:a16="http://schemas.microsoft.com/office/drawing/2014/main" id="{ED5AAF87-5132-49A2-BA4B-F60CA9B9AE29}"/>
-              </a:ext>
-            </a:extLst>
-          </p:cNvPr>
-          <p:cNvSpPr>
-            <a:spLocks noGrp="1"/>
-          </p:cNvSpPr>
-          <p:nvPr>
-            <p:ph type="title"/>
-          </p:nvPr>
-        </p:nvSpPr>
-        <p:spPr>
-          <a:xfrm>
-            <a:off x="425454" y="1296001"/>
-            <a:ext cx="11345332" cy="609780"/>
-          </a:xfrm>
-        </p:spPr>
-        <p:txBody>
-          <a:bodyPr/>
-          <a:lstStyle/>
-          <a:p>
-            <a:r>
-              <a:rPr lang="de-DE"/>
-              <a:t>Auswertung - Simulationsergebnisse</a:t>
-            </a:r>
-            <a:r>
-              <a:rPr lang="en-DE"/>
-              <a:t> für </a:t>
-            </a:r>
-            <a:r>
-              <a:rPr lang="en-DE">
-                <a:sym typeface="Symbol" panose="05050102010706020507" pitchFamily="18" charset="2"/>
-              </a:rPr>
-              <a:t> = 3.5</a:t>
-            </a:r>
-            <a:br>
-              <a:rPr lang="en-DE">
-                <a:sym typeface="Symbol" panose="05050102010706020507" pitchFamily="18" charset="2"/>
-              </a:rPr>
-            </a:br>
-            <a:endParaRPr lang="de-DE"/>
-          </a:p>
-        </p:txBody>
-      </p:sp>
+      <mc:AlternateContent xmlns:mc="http://schemas.openxmlformats.org/markup-compatibility/2006" xmlns:a14="http://schemas.microsoft.com/office/drawing/2010/main">
+        <mc:Choice Requires="a14">
+          <p:sp>
+            <p:nvSpPr>
+              <p:cNvPr id="4" name="Title 3">
+                <a:extLst>
+                  <a:ext uri="{FF2B5EF4-FFF2-40B4-BE49-F238E27FC236}">
+                    <a16:creationId xmlns:a16="http://schemas.microsoft.com/office/drawing/2014/main" id="{ED5AAF87-5132-49A2-BA4B-F60CA9B9AE29}"/>
+                  </a:ext>
+                </a:extLst>
+              </p:cNvPr>
+              <p:cNvSpPr>
+                <a:spLocks noGrp="1"/>
+              </p:cNvSpPr>
+              <p:nvPr>
+                <p:ph type="title"/>
+              </p:nvPr>
+            </p:nvSpPr>
+            <p:spPr>
+              <a:xfrm>
+                <a:off x="425454" y="1296001"/>
+                <a:ext cx="11345332" cy="1062342"/>
+              </a:xfrm>
+            </p:spPr>
+            <p:txBody>
+              <a:bodyPr/>
+              <a:lstStyle/>
+              <a:p>
+                <a:r>
+                  <a:rPr lang="de-DE" dirty="0"/>
+                  <a:t>Auswertung - Simulationsergebnisse</a:t>
+                </a:r>
+                <a:r>
+                  <a:rPr lang="en-DE" dirty="0"/>
+                  <a:t> für </a:t>
+                </a:r>
+                <a14:m>
+                  <m:oMath xmlns:m="http://schemas.openxmlformats.org/officeDocument/2006/math">
+                    <m:sSub>
+                      <m:sSubPr>
+                        <m:ctrlPr>
+                          <a:rPr lang="en-DE" i="1" smtClean="0">
+                            <a:latin typeface="Cambria Math" panose="02040503050406030204" pitchFamily="18" charset="0"/>
+                            <a:sym typeface="Symbol" panose="05050102010706020507" pitchFamily="18" charset="2"/>
+                          </a:rPr>
+                        </m:ctrlPr>
+                      </m:sSubPr>
+                      <m:e>
+                        <m:r>
+                          <a:rPr lang="en-DE" i="1" smtClean="0">
+                            <a:latin typeface="Cambria Math" panose="02040503050406030204" pitchFamily="18" charset="0"/>
+                            <a:ea typeface="Cambria Math" panose="02040503050406030204" pitchFamily="18" charset="0"/>
+                            <a:sym typeface="Symbol" panose="05050102010706020507" pitchFamily="18" charset="2"/>
+                          </a:rPr>
+                          <m:t>𝜃</m:t>
+                        </m:r>
+                      </m:e>
+                      <m:sub>
+                        <m:r>
+                          <a:rPr lang="en-GB" b="0" i="1" smtClean="0">
+                            <a:latin typeface="Cambria Math" panose="02040503050406030204" pitchFamily="18" charset="0"/>
+                            <a:sym typeface="Symbol" panose="05050102010706020507" pitchFamily="18" charset="2"/>
+                          </a:rPr>
+                          <m:t>0</m:t>
+                        </m:r>
+                      </m:sub>
+                    </m:sSub>
+                  </m:oMath>
+                </a14:m>
+                <a:r>
+                  <a:rPr lang="en-DE" dirty="0">
+                    <a:sym typeface="Symbol" panose="05050102010706020507" pitchFamily="18" charset="2"/>
+                  </a:rPr>
+                  <a:t> = 3.5</a:t>
+                </a:r>
+                <a:br>
+                  <a:rPr lang="en-DE" dirty="0">
+                    <a:sym typeface="Symbol" panose="05050102010706020507" pitchFamily="18" charset="2"/>
+                  </a:rPr>
+                </a:br>
+                <a:endParaRPr lang="de-DE" dirty="0"/>
+              </a:p>
+            </p:txBody>
+          </p:sp>
+        </mc:Choice>
+        <mc:Fallback xmlns="">
+          <p:sp>
+            <p:nvSpPr>
+              <p:cNvPr id="4" name="Title 3">
+                <a:extLst>
+                  <a:ext uri="{FF2B5EF4-FFF2-40B4-BE49-F238E27FC236}">
+                    <a16:creationId xmlns:a16="http://schemas.microsoft.com/office/drawing/2014/main" id="{ED5AAF87-5132-49A2-BA4B-F60CA9B9AE29}"/>
+                  </a:ext>
+                </a:extLst>
+              </p:cNvPr>
+              <p:cNvSpPr>
+                <a:spLocks noGrp="1" noRot="1" noChangeAspect="1" noMove="1" noResize="1" noEditPoints="1" noAdjustHandles="1" noChangeArrowheads="1" noChangeShapeType="1" noTextEdit="1"/>
+              </p:cNvSpPr>
+              <p:nvPr>
+                <p:ph type="title"/>
+              </p:nvPr>
+            </p:nvSpPr>
+            <p:spPr>
+              <a:xfrm>
+                <a:off x="425454" y="1296001"/>
+                <a:ext cx="11345332" cy="1062342"/>
+              </a:xfrm>
+              <a:blipFill>
+                <a:blip r:embed="rId3"/>
+                <a:stretch>
+                  <a:fillRect l="-2257" t="-12644"/>
+                </a:stretch>
+              </a:blipFill>
+            </p:spPr>
+            <p:txBody>
+              <a:bodyPr/>
+              <a:lstStyle/>
+              <a:p>
+                <a:r>
+                  <a:rPr lang="en-DE">
+                    <a:noFill/>
+                  </a:rPr>
+                  <a:t> </a:t>
+                </a:r>
+              </a:p>
+            </p:txBody>
+          </p:sp>
+        </mc:Fallback>
+      </mc:AlternateContent>
       <p:sp>
         <p:nvSpPr>
           <p:cNvPr id="5" name="Slide Number Placeholder 4">
@@ -11125,7 +11567,7 @@
           </p:nvPr>
         </p:nvPicPr>
         <p:blipFill>
-          <a:blip r:embed="rId3">
+          <a:blip r:embed="rId4">
             <a:extLst>
               <a:ext uri="{28A0092B-C50C-407E-A947-70E740481C1C}">
                 <a14:useLocalDpi xmlns:a14="http://schemas.microsoft.com/office/drawing/2010/main" val="0"/>
@@ -11156,7 +11598,7 @@
           </p:nvPr>
         </p:nvPicPr>
         <p:blipFill>
-          <a:blip r:embed="rId4">
+          <a:blip r:embed="rId5">
             <a:extLst>
               <a:ext uri="{28A0092B-C50C-407E-A947-70E740481C1C}">
                 <a14:useLocalDpi xmlns:a14="http://schemas.microsoft.com/office/drawing/2010/main" val="0"/>
@@ -11187,7 +11629,7 @@
           </p:nvPr>
         </p:nvPicPr>
         <p:blipFill>
-          <a:blip r:embed="rId5">
+          <a:blip r:embed="rId6">
             <a:extLst>
               <a:ext uri="{28A0092B-C50C-407E-A947-70E740481C1C}">
                 <a14:useLocalDpi xmlns:a14="http://schemas.microsoft.com/office/drawing/2010/main" val="0"/>
@@ -11218,7 +11660,7 @@
           </p:nvPr>
         </p:nvPicPr>
         <p:blipFill>
-          <a:blip r:embed="rId6">
+          <a:blip r:embed="rId7">
             <a:extLst>
               <a:ext uri="{28A0092B-C50C-407E-A947-70E740481C1C}">
                 <a14:useLocalDpi xmlns:a14="http://schemas.microsoft.com/office/drawing/2010/main" val="0"/>
@@ -11249,7 +11691,7 @@
           </p:nvPr>
         </p:nvPicPr>
         <p:blipFill>
-          <a:blip r:embed="rId7">
+          <a:blip r:embed="rId8">
             <a:extLst>
               <a:ext uri="{28A0092B-C50C-407E-A947-70E740481C1C}">
                 <a14:useLocalDpi xmlns:a14="http://schemas.microsoft.com/office/drawing/2010/main" val="0"/>
@@ -11280,7 +11722,7 @@
           </p:nvPr>
         </p:nvPicPr>
         <p:blipFill>
-          <a:blip r:embed="rId8">
+          <a:blip r:embed="rId9">
             <a:extLst>
               <a:ext uri="{28A0092B-C50C-407E-A947-70E740481C1C}">
                 <a14:useLocalDpi xmlns:a14="http://schemas.microsoft.com/office/drawing/2010/main" val="0"/>
@@ -11324,55 +11766,135 @@
           <a:chExt cx="0" cy="0"/>
         </a:xfrm>
       </p:grpSpPr>
-      <p:sp>
-        <p:nvSpPr>
-          <p:cNvPr id="4" name="Title 3">
-            <a:extLst>
-              <a:ext uri="{FF2B5EF4-FFF2-40B4-BE49-F238E27FC236}">
-                <a16:creationId xmlns:a16="http://schemas.microsoft.com/office/drawing/2014/main" id="{ED5AAF87-5132-49A2-BA4B-F60CA9B9AE29}"/>
-              </a:ext>
-            </a:extLst>
-          </p:cNvPr>
-          <p:cNvSpPr>
-            <a:spLocks noGrp="1"/>
-          </p:cNvSpPr>
-          <p:nvPr>
-            <p:ph type="title"/>
-          </p:nvPr>
-        </p:nvSpPr>
-        <p:spPr>
-          <a:xfrm>
-            <a:off x="425454" y="1296001"/>
-            <a:ext cx="11345332" cy="590219"/>
-          </a:xfrm>
-        </p:spPr>
-        <p:txBody>
-          <a:bodyPr/>
-          <a:lstStyle/>
-          <a:p>
-            <a:r>
-              <a:rPr lang="de-DE"/>
-              <a:t>Auswertung - Simulationsergebnisse</a:t>
-            </a:r>
-            <a:r>
-              <a:rPr lang="en-DE"/>
-              <a:t> für </a:t>
-            </a:r>
-            <a:r>
-              <a:rPr lang="en-DE">
-                <a:sym typeface="Symbol" panose="05050102010706020507" pitchFamily="18" charset="2"/>
-              </a:rPr>
-              <a:t> = 5.0</a:t>
-            </a:r>
-            <a:br>
-              <a:rPr lang="en-DE">
-                <a:sym typeface="Symbol" panose="05050102010706020507" pitchFamily="18" charset="2"/>
-              </a:rPr>
-            </a:br>
-            <a:endParaRPr lang="de-DE"/>
-          </a:p>
-        </p:txBody>
-      </p:sp>
+      <mc:AlternateContent xmlns:mc="http://schemas.openxmlformats.org/markup-compatibility/2006" xmlns:a14="http://schemas.microsoft.com/office/drawing/2010/main">
+        <mc:Choice Requires="a14">
+          <p:sp>
+            <p:nvSpPr>
+              <p:cNvPr id="4" name="Title 3">
+                <a:extLst>
+                  <a:ext uri="{FF2B5EF4-FFF2-40B4-BE49-F238E27FC236}">
+                    <a16:creationId xmlns:a16="http://schemas.microsoft.com/office/drawing/2014/main" id="{ED5AAF87-5132-49A2-BA4B-F60CA9B9AE29}"/>
+                  </a:ext>
+                </a:extLst>
+              </p:cNvPr>
+              <p:cNvSpPr>
+                <a:spLocks noGrp="1"/>
+              </p:cNvSpPr>
+              <p:nvPr>
+                <p:ph type="title"/>
+              </p:nvPr>
+            </p:nvSpPr>
+            <p:spPr>
+              <a:xfrm>
+                <a:off x="425454" y="1296001"/>
+                <a:ext cx="11345332" cy="1062342"/>
+              </a:xfrm>
+            </p:spPr>
+            <p:txBody>
+              <a:bodyPr/>
+              <a:lstStyle/>
+              <a:p>
+                <a:r>
+                  <a:rPr lang="de-DE" dirty="0"/>
+                  <a:t>Auswertung - Simulationsergebnisse</a:t>
+                </a:r>
+                <a:r>
+                  <a:rPr lang="en-DE" dirty="0"/>
+                  <a:t> für </a:t>
+                </a:r>
+                <a14:m>
+                  <m:oMath xmlns:m="http://schemas.openxmlformats.org/officeDocument/2006/math">
+                    <m:sSub>
+                      <m:sSubPr>
+                        <m:ctrlPr>
+                          <a:rPr lang="en-DE" i="1" smtClean="0">
+                            <a:latin typeface="Cambria Math" panose="02040503050406030204" pitchFamily="18" charset="0"/>
+                            <a:sym typeface="Symbol" panose="05050102010706020507" pitchFamily="18" charset="2"/>
+                          </a:rPr>
+                        </m:ctrlPr>
+                      </m:sSubPr>
+                      <m:e>
+                        <m:r>
+                          <a:rPr lang="en-DE" i="1" smtClean="0">
+                            <a:latin typeface="Cambria Math" panose="02040503050406030204" pitchFamily="18" charset="0"/>
+                            <a:ea typeface="Cambria Math" panose="02040503050406030204" pitchFamily="18" charset="0"/>
+                            <a:sym typeface="Symbol" panose="05050102010706020507" pitchFamily="18" charset="2"/>
+                          </a:rPr>
+                          <m:t>𝜃</m:t>
+                        </m:r>
+                      </m:e>
+                      <m:sub>
+                        <m:r>
+                          <a:rPr lang="en-GB" b="0" i="1" smtClean="0">
+                            <a:latin typeface="Cambria Math" panose="02040503050406030204" pitchFamily="18" charset="0"/>
+                            <a:sym typeface="Symbol" panose="05050102010706020507" pitchFamily="18" charset="2"/>
+                          </a:rPr>
+                          <m:t>0</m:t>
+                        </m:r>
+                      </m:sub>
+                    </m:sSub>
+                  </m:oMath>
+                </a14:m>
+                <a:r>
+                  <a:rPr lang="en-DE" dirty="0">
+                    <a:sym typeface="Symbol" panose="05050102010706020507" pitchFamily="18" charset="2"/>
+                  </a:rPr>
+                  <a:t> = 5.0</a:t>
+                </a:r>
+                <a:br>
+                  <a:rPr lang="en-DE" dirty="0">
+                    <a:sym typeface="Symbol" panose="05050102010706020507" pitchFamily="18" charset="2"/>
+                  </a:rPr>
+                </a:br>
+                <a:endParaRPr lang="de-DE" dirty="0"/>
+              </a:p>
+            </p:txBody>
+          </p:sp>
+        </mc:Choice>
+        <mc:Fallback xmlns="">
+          <p:sp>
+            <p:nvSpPr>
+              <p:cNvPr id="4" name="Title 3">
+                <a:extLst>
+                  <a:ext uri="{FF2B5EF4-FFF2-40B4-BE49-F238E27FC236}">
+                    <a16:creationId xmlns:a16="http://schemas.microsoft.com/office/drawing/2014/main" id="{ED5AAF87-5132-49A2-BA4B-F60CA9B9AE29}"/>
+                  </a:ext>
+                </a:extLst>
+              </p:cNvPr>
+              <p:cNvSpPr>
+                <a:spLocks noGrp="1" noRot="1" noChangeAspect="1" noMove="1" noResize="1" noEditPoints="1" noAdjustHandles="1" noChangeArrowheads="1" noChangeShapeType="1" noTextEdit="1"/>
+              </p:cNvSpPr>
+              <p:nvPr>
+                <p:ph type="title"/>
+              </p:nvPr>
+            </p:nvSpPr>
+            <p:spPr>
+              <a:xfrm>
+                <a:off x="425454" y="1296001"/>
+                <a:ext cx="11345332" cy="1062342"/>
+              </a:xfrm>
+              <a:blipFill>
+                <a:blip r:embed="rId3"/>
+                <a:stretch>
+                  <a:fillRect l="-2257" t="-12644"/>
+                </a:stretch>
+              </a:blipFill>
+            </p:spPr>
+            <p:txBody>
+              <a:bodyPr/>
+              <a:lstStyle/>
+              <a:p>
+                <a:r>
+                  <a:rPr lang="en-DE">
+                    <a:noFill/>
+                  </a:rPr>
+                  <a:t> </a:t>
+                </a:r>
+              </a:p>
+            </p:txBody>
+          </p:sp>
+        </mc:Fallback>
+      </mc:AlternateContent>
       <p:sp>
         <p:nvSpPr>
           <p:cNvPr id="5" name="Slide Number Placeholder 4">
@@ -11420,7 +11942,7 @@
           </p:nvPr>
         </p:nvPicPr>
         <p:blipFill>
-          <a:blip r:embed="rId3">
+          <a:blip r:embed="rId4">
             <a:extLst>
               <a:ext uri="{28A0092B-C50C-407E-A947-70E740481C1C}">
                 <a14:useLocalDpi xmlns:a14="http://schemas.microsoft.com/office/drawing/2010/main" val="0"/>
@@ -11451,7 +11973,7 @@
           </p:nvPr>
         </p:nvPicPr>
         <p:blipFill>
-          <a:blip r:embed="rId4">
+          <a:blip r:embed="rId5">
             <a:extLst>
               <a:ext uri="{28A0092B-C50C-407E-A947-70E740481C1C}">
                 <a14:useLocalDpi xmlns:a14="http://schemas.microsoft.com/office/drawing/2010/main" val="0"/>
@@ -11482,7 +12004,7 @@
           </p:nvPr>
         </p:nvPicPr>
         <p:blipFill>
-          <a:blip r:embed="rId5">
+          <a:blip r:embed="rId6">
             <a:extLst>
               <a:ext uri="{28A0092B-C50C-407E-A947-70E740481C1C}">
                 <a14:useLocalDpi xmlns:a14="http://schemas.microsoft.com/office/drawing/2010/main" val="0"/>
@@ -11513,7 +12035,7 @@
           </p:nvPr>
         </p:nvPicPr>
         <p:blipFill>
-          <a:blip r:embed="rId6">
+          <a:blip r:embed="rId7">
             <a:extLst>
               <a:ext uri="{28A0092B-C50C-407E-A947-70E740481C1C}">
                 <a14:useLocalDpi xmlns:a14="http://schemas.microsoft.com/office/drawing/2010/main" val="0"/>
@@ -11544,7 +12066,7 @@
           </p:nvPr>
         </p:nvPicPr>
         <p:blipFill>
-          <a:blip r:embed="rId7">
+          <a:blip r:embed="rId8">
             <a:extLst>
               <a:ext uri="{28A0092B-C50C-407E-A947-70E740481C1C}">
                 <a14:useLocalDpi xmlns:a14="http://schemas.microsoft.com/office/drawing/2010/main" val="0"/>
@@ -11575,7 +12097,7 @@
           </p:nvPr>
         </p:nvPicPr>
         <p:blipFill>
-          <a:blip r:embed="rId8">
+          <a:blip r:embed="rId9">
             <a:extLst>
               <a:ext uri="{28A0092B-C50C-407E-A947-70E740481C1C}">
                 <a14:useLocalDpi xmlns:a14="http://schemas.microsoft.com/office/drawing/2010/main" val="0"/>

</xml_diff>